<commit_message>
added some additional icons
</commit_message>
<xml_diff>
--- a/Icons/resources/icons.pptx
+++ b/Icons/resources/icons.pptx
@@ -17,6 +17,10 @@
     <p:sldId id="261" r:id="rId11"/>
     <p:sldId id="262" r:id="rId12"/>
     <p:sldId id="263" r:id="rId13"/>
+    <p:sldId id="268" r:id="rId14"/>
+    <p:sldId id="269" r:id="rId15"/>
+    <p:sldId id="270" r:id="rId16"/>
+    <p:sldId id="271" r:id="rId17"/>
   </p:sldIdLst>
   <p:sldSz cx="12192000" cy="6858000"/>
   <p:notesSz cx="6858000" cy="9144000"/>
@@ -270,7 +274,7 @@
           <a:p>
             <a:fld id="{4A999458-6FB2-4E25-ABC3-017CB7C0005E}" type="datetimeFigureOut">
               <a:rPr lang="en-US" smtClean="0"/>
-              <a:t>3/29/2021</a:t>
+              <a:t>8/23/2022</a:t>
             </a:fld>
             <a:endParaRPr lang="en-US"/>
           </a:p>
@@ -468,7 +472,7 @@
           <a:p>
             <a:fld id="{4A999458-6FB2-4E25-ABC3-017CB7C0005E}" type="datetimeFigureOut">
               <a:rPr lang="en-US" smtClean="0"/>
-              <a:t>3/29/2021</a:t>
+              <a:t>8/23/2022</a:t>
             </a:fld>
             <a:endParaRPr lang="en-US"/>
           </a:p>
@@ -676,7 +680,7 @@
           <a:p>
             <a:fld id="{4A999458-6FB2-4E25-ABC3-017CB7C0005E}" type="datetimeFigureOut">
               <a:rPr lang="en-US" smtClean="0"/>
-              <a:t>3/29/2021</a:t>
+              <a:t>8/23/2022</a:t>
             </a:fld>
             <a:endParaRPr lang="en-US"/>
           </a:p>
@@ -874,7 +878,7 @@
           <a:p>
             <a:fld id="{4A999458-6FB2-4E25-ABC3-017CB7C0005E}" type="datetimeFigureOut">
               <a:rPr lang="en-US" smtClean="0"/>
-              <a:t>3/29/2021</a:t>
+              <a:t>8/23/2022</a:t>
             </a:fld>
             <a:endParaRPr lang="en-US"/>
           </a:p>
@@ -1149,7 +1153,7 @@
           <a:p>
             <a:fld id="{4A999458-6FB2-4E25-ABC3-017CB7C0005E}" type="datetimeFigureOut">
               <a:rPr lang="en-US" smtClean="0"/>
-              <a:t>3/29/2021</a:t>
+              <a:t>8/23/2022</a:t>
             </a:fld>
             <a:endParaRPr lang="en-US"/>
           </a:p>
@@ -1414,7 +1418,7 @@
           <a:p>
             <a:fld id="{4A999458-6FB2-4E25-ABC3-017CB7C0005E}" type="datetimeFigureOut">
               <a:rPr lang="en-US" smtClean="0"/>
-              <a:t>3/29/2021</a:t>
+              <a:t>8/23/2022</a:t>
             </a:fld>
             <a:endParaRPr lang="en-US"/>
           </a:p>
@@ -1826,7 +1830,7 @@
           <a:p>
             <a:fld id="{4A999458-6FB2-4E25-ABC3-017CB7C0005E}" type="datetimeFigureOut">
               <a:rPr lang="en-US" smtClean="0"/>
-              <a:t>3/29/2021</a:t>
+              <a:t>8/23/2022</a:t>
             </a:fld>
             <a:endParaRPr lang="en-US"/>
           </a:p>
@@ -1967,7 +1971,7 @@
           <a:p>
             <a:fld id="{4A999458-6FB2-4E25-ABC3-017CB7C0005E}" type="datetimeFigureOut">
               <a:rPr lang="en-US" smtClean="0"/>
-              <a:t>3/29/2021</a:t>
+              <a:t>8/23/2022</a:t>
             </a:fld>
             <a:endParaRPr lang="en-US"/>
           </a:p>
@@ -2080,7 +2084,7 @@
           <a:p>
             <a:fld id="{4A999458-6FB2-4E25-ABC3-017CB7C0005E}" type="datetimeFigureOut">
               <a:rPr lang="en-US" smtClean="0"/>
-              <a:t>3/29/2021</a:t>
+              <a:t>8/23/2022</a:t>
             </a:fld>
             <a:endParaRPr lang="en-US"/>
           </a:p>
@@ -2391,7 +2395,7 @@
           <a:p>
             <a:fld id="{4A999458-6FB2-4E25-ABC3-017CB7C0005E}" type="datetimeFigureOut">
               <a:rPr lang="en-US" smtClean="0"/>
-              <a:t>3/29/2021</a:t>
+              <a:t>8/23/2022</a:t>
             </a:fld>
             <a:endParaRPr lang="en-US"/>
           </a:p>
@@ -2679,7 +2683,7 @@
           <a:p>
             <a:fld id="{4A999458-6FB2-4E25-ABC3-017CB7C0005E}" type="datetimeFigureOut">
               <a:rPr lang="en-US" smtClean="0"/>
-              <a:t>3/29/2021</a:t>
+              <a:t>8/23/2022</a:t>
             </a:fld>
             <a:endParaRPr lang="en-US"/>
           </a:p>
@@ -2920,7 +2924,7 @@
           <a:p>
             <a:fld id="{4A999458-6FB2-4E25-ABC3-017CB7C0005E}" type="datetimeFigureOut">
               <a:rPr lang="en-US" smtClean="0"/>
-              <a:t>3/29/2021</a:t>
+              <a:t>8/23/2022</a:t>
             </a:fld>
             <a:endParaRPr lang="en-US"/>
           </a:p>
@@ -7137,6 +7141,3566 @@
     <p:extLst>
       <p:ext uri="{BB962C8B-B14F-4D97-AF65-F5344CB8AC3E}">
         <p14:creationId xmlns:p14="http://schemas.microsoft.com/office/powerpoint/2010/main" val="665297842"/>
+      </p:ext>
+    </p:extLst>
+  </p:cSld>
+  <p:clrMapOvr>
+    <a:masterClrMapping/>
+  </p:clrMapOvr>
+</p:sld>
+</file>
+
+<file path=ppt/slides/slide13.xml><?xml version="1.0" encoding="utf-8"?>
+<p:sld xmlns:a="http://schemas.openxmlformats.org/drawingml/2006/main" xmlns:r="http://schemas.openxmlformats.org/officeDocument/2006/relationships" xmlns:p="http://schemas.openxmlformats.org/presentationml/2006/main">
+  <p:cSld>
+    <p:spTree>
+      <p:nvGrpSpPr>
+        <p:cNvPr id="1" name=""/>
+        <p:cNvGrpSpPr/>
+        <p:nvPr/>
+      </p:nvGrpSpPr>
+      <p:grpSpPr>
+        <a:xfrm>
+          <a:off x="0" y="0"/>
+          <a:ext cx="0" cy="0"/>
+          <a:chOff x="0" y="0"/>
+          <a:chExt cx="0" cy="0"/>
+        </a:xfrm>
+      </p:grpSpPr>
+      <p:sp>
+        <p:nvSpPr>
+          <p:cNvPr id="5" name="Rectangle 4">
+            <a:extLst>
+              <a:ext uri="{FF2B5EF4-FFF2-40B4-BE49-F238E27FC236}">
+                <a16:creationId xmlns:a16="http://schemas.microsoft.com/office/drawing/2014/main" id="{F061ACAB-424F-4501-97F7-30C21D0EA7A1}"/>
+              </a:ext>
+            </a:extLst>
+          </p:cNvPr>
+          <p:cNvSpPr/>
+          <p:nvPr/>
+        </p:nvSpPr>
+        <p:spPr>
+          <a:xfrm>
+            <a:off x="602166" y="5999356"/>
+            <a:ext cx="579864" cy="549697"/>
+          </a:xfrm>
+          <a:prstGeom prst="rect">
+            <a:avLst/>
+          </a:prstGeom>
+          <a:solidFill>
+            <a:srgbClr val="F96160"/>
+          </a:solidFill>
+          <a:ln>
+            <a:noFill/>
+          </a:ln>
+        </p:spPr>
+        <p:style>
+          <a:lnRef idx="2">
+            <a:schemeClr val="accent1">
+              <a:shade val="50000"/>
+            </a:schemeClr>
+          </a:lnRef>
+          <a:fillRef idx="1">
+            <a:schemeClr val="accent1"/>
+          </a:fillRef>
+          <a:effectRef idx="0">
+            <a:schemeClr val="accent1"/>
+          </a:effectRef>
+          <a:fontRef idx="minor">
+            <a:schemeClr val="lt1"/>
+          </a:fontRef>
+        </p:style>
+        <p:txBody>
+          <a:bodyPr rtlCol="0" anchor="ctr"/>
+          <a:lstStyle/>
+          <a:p>
+            <a:pPr algn="ctr"/>
+            <a:endParaRPr lang="en-US"/>
+          </a:p>
+        </p:txBody>
+      </p:sp>
+      <p:sp>
+        <p:nvSpPr>
+          <p:cNvPr id="7" name="Rectangle 6">
+            <a:extLst>
+              <a:ext uri="{FF2B5EF4-FFF2-40B4-BE49-F238E27FC236}">
+                <a16:creationId xmlns:a16="http://schemas.microsoft.com/office/drawing/2014/main" id="{CCB2303E-C712-4CC7-A07E-30C89AA6C536}"/>
+              </a:ext>
+            </a:extLst>
+          </p:cNvPr>
+          <p:cNvSpPr/>
+          <p:nvPr/>
+        </p:nvSpPr>
+        <p:spPr>
+          <a:xfrm>
+            <a:off x="1632725" y="5999355"/>
+            <a:ext cx="579864" cy="549697"/>
+          </a:xfrm>
+          <a:prstGeom prst="rect">
+            <a:avLst/>
+          </a:prstGeom>
+          <a:solidFill>
+            <a:srgbClr val="FBBB4D"/>
+          </a:solidFill>
+          <a:ln>
+            <a:noFill/>
+          </a:ln>
+        </p:spPr>
+        <p:style>
+          <a:lnRef idx="2">
+            <a:schemeClr val="accent1">
+              <a:shade val="50000"/>
+            </a:schemeClr>
+          </a:lnRef>
+          <a:fillRef idx="1">
+            <a:schemeClr val="accent1"/>
+          </a:fillRef>
+          <a:effectRef idx="0">
+            <a:schemeClr val="accent1"/>
+          </a:effectRef>
+          <a:fontRef idx="minor">
+            <a:schemeClr val="lt1"/>
+          </a:fontRef>
+        </p:style>
+        <p:txBody>
+          <a:bodyPr rtlCol="0" anchor="ctr"/>
+          <a:lstStyle/>
+          <a:p>
+            <a:pPr algn="ctr"/>
+            <a:endParaRPr lang="en-US"/>
+          </a:p>
+        </p:txBody>
+      </p:sp>
+      <p:sp>
+        <p:nvSpPr>
+          <p:cNvPr id="8" name="Rectangle 7">
+            <a:extLst>
+              <a:ext uri="{FF2B5EF4-FFF2-40B4-BE49-F238E27FC236}">
+                <a16:creationId xmlns:a16="http://schemas.microsoft.com/office/drawing/2014/main" id="{5D372310-AF1C-41DC-90C3-5A0D1E14266A}"/>
+              </a:ext>
+            </a:extLst>
+          </p:cNvPr>
+          <p:cNvSpPr/>
+          <p:nvPr/>
+        </p:nvSpPr>
+        <p:spPr>
+          <a:xfrm>
+            <a:off x="2663284" y="5999355"/>
+            <a:ext cx="579864" cy="549697"/>
+          </a:xfrm>
+          <a:prstGeom prst="rect">
+            <a:avLst/>
+          </a:prstGeom>
+          <a:solidFill>
+            <a:srgbClr val="3EC451"/>
+          </a:solidFill>
+          <a:ln>
+            <a:noFill/>
+          </a:ln>
+        </p:spPr>
+        <p:style>
+          <a:lnRef idx="2">
+            <a:schemeClr val="accent1">
+              <a:shade val="50000"/>
+            </a:schemeClr>
+          </a:lnRef>
+          <a:fillRef idx="1">
+            <a:schemeClr val="accent1"/>
+          </a:fillRef>
+          <a:effectRef idx="0">
+            <a:schemeClr val="accent1"/>
+          </a:effectRef>
+          <a:fontRef idx="minor">
+            <a:schemeClr val="lt1"/>
+          </a:fontRef>
+        </p:style>
+        <p:txBody>
+          <a:bodyPr rtlCol="0" anchor="ctr"/>
+          <a:lstStyle/>
+          <a:p>
+            <a:pPr algn="ctr"/>
+            <a:endParaRPr lang="en-US" dirty="0"/>
+          </a:p>
+        </p:txBody>
+      </p:sp>
+      <p:sp>
+        <p:nvSpPr>
+          <p:cNvPr id="9" name="Rectangle 8">
+            <a:extLst>
+              <a:ext uri="{FF2B5EF4-FFF2-40B4-BE49-F238E27FC236}">
+                <a16:creationId xmlns:a16="http://schemas.microsoft.com/office/drawing/2014/main" id="{C59D9ACE-0F71-4801-AEA0-AA357C2034E7}"/>
+              </a:ext>
+            </a:extLst>
+          </p:cNvPr>
+          <p:cNvSpPr/>
+          <p:nvPr/>
+        </p:nvSpPr>
+        <p:spPr>
+          <a:xfrm>
+            <a:off x="3693843" y="5999355"/>
+            <a:ext cx="579864" cy="549697"/>
+          </a:xfrm>
+          <a:prstGeom prst="rect">
+            <a:avLst/>
+          </a:prstGeom>
+          <a:solidFill>
+            <a:srgbClr val="4BB8F3"/>
+          </a:solidFill>
+          <a:ln>
+            <a:noFill/>
+          </a:ln>
+        </p:spPr>
+        <p:style>
+          <a:lnRef idx="2">
+            <a:schemeClr val="accent1">
+              <a:shade val="50000"/>
+            </a:schemeClr>
+          </a:lnRef>
+          <a:fillRef idx="1">
+            <a:schemeClr val="accent1"/>
+          </a:fillRef>
+          <a:effectRef idx="0">
+            <a:schemeClr val="accent1"/>
+          </a:effectRef>
+          <a:fontRef idx="minor">
+            <a:schemeClr val="lt1"/>
+          </a:fontRef>
+        </p:style>
+        <p:txBody>
+          <a:bodyPr rtlCol="0" anchor="ctr"/>
+          <a:lstStyle/>
+          <a:p>
+            <a:pPr algn="ctr"/>
+            <a:endParaRPr lang="en-US"/>
+          </a:p>
+        </p:txBody>
+      </p:sp>
+      <p:sp>
+        <p:nvSpPr>
+          <p:cNvPr id="13" name="Rectangle 12">
+            <a:extLst>
+              <a:ext uri="{FF2B5EF4-FFF2-40B4-BE49-F238E27FC236}">
+                <a16:creationId xmlns:a16="http://schemas.microsoft.com/office/drawing/2014/main" id="{A4AF4B1F-0B61-4962-B93C-3A917575583C}"/>
+              </a:ext>
+            </a:extLst>
+          </p:cNvPr>
+          <p:cNvSpPr/>
+          <p:nvPr/>
+        </p:nvSpPr>
+        <p:spPr>
+          <a:xfrm>
+            <a:off x="4724402" y="5999355"/>
+            <a:ext cx="579864" cy="549697"/>
+          </a:xfrm>
+          <a:prstGeom prst="rect">
+            <a:avLst/>
+          </a:prstGeom>
+          <a:solidFill>
+            <a:srgbClr val="353535"/>
+          </a:solidFill>
+          <a:ln>
+            <a:noFill/>
+          </a:ln>
+        </p:spPr>
+        <p:style>
+          <a:lnRef idx="2">
+            <a:schemeClr val="accent1">
+              <a:shade val="50000"/>
+            </a:schemeClr>
+          </a:lnRef>
+          <a:fillRef idx="1">
+            <a:schemeClr val="accent1"/>
+          </a:fillRef>
+          <a:effectRef idx="0">
+            <a:schemeClr val="accent1"/>
+          </a:effectRef>
+          <a:fontRef idx="minor">
+            <a:schemeClr val="lt1"/>
+          </a:fontRef>
+        </p:style>
+        <p:txBody>
+          <a:bodyPr rtlCol="0" anchor="ctr"/>
+          <a:lstStyle/>
+          <a:p>
+            <a:pPr algn="ctr"/>
+            <a:endParaRPr lang="en-US"/>
+          </a:p>
+        </p:txBody>
+      </p:sp>
+      <p:sp>
+        <p:nvSpPr>
+          <p:cNvPr id="21" name="Rectangle 20">
+            <a:extLst>
+              <a:ext uri="{FF2B5EF4-FFF2-40B4-BE49-F238E27FC236}">
+                <a16:creationId xmlns:a16="http://schemas.microsoft.com/office/drawing/2014/main" id="{C9527B53-C5C5-409E-9633-74903E8F3DAA}"/>
+              </a:ext>
+            </a:extLst>
+          </p:cNvPr>
+          <p:cNvSpPr/>
+          <p:nvPr/>
+        </p:nvSpPr>
+        <p:spPr>
+          <a:xfrm>
+            <a:off x="602166" y="5999356"/>
+            <a:ext cx="579864" cy="549697"/>
+          </a:xfrm>
+          <a:prstGeom prst="rect">
+            <a:avLst/>
+          </a:prstGeom>
+          <a:solidFill>
+            <a:srgbClr val="F96160"/>
+          </a:solidFill>
+          <a:ln>
+            <a:noFill/>
+          </a:ln>
+        </p:spPr>
+        <p:style>
+          <a:lnRef idx="2">
+            <a:schemeClr val="accent1">
+              <a:shade val="50000"/>
+            </a:schemeClr>
+          </a:lnRef>
+          <a:fillRef idx="1">
+            <a:schemeClr val="accent1"/>
+          </a:fillRef>
+          <a:effectRef idx="0">
+            <a:schemeClr val="accent1"/>
+          </a:effectRef>
+          <a:fontRef idx="minor">
+            <a:schemeClr val="lt1"/>
+          </a:fontRef>
+        </p:style>
+        <p:txBody>
+          <a:bodyPr rtlCol="0" anchor="ctr"/>
+          <a:lstStyle/>
+          <a:p>
+            <a:pPr algn="ctr"/>
+            <a:endParaRPr lang="en-US"/>
+          </a:p>
+        </p:txBody>
+      </p:sp>
+      <p:sp>
+        <p:nvSpPr>
+          <p:cNvPr id="22" name="Rectangle 21">
+            <a:extLst>
+              <a:ext uri="{FF2B5EF4-FFF2-40B4-BE49-F238E27FC236}">
+                <a16:creationId xmlns:a16="http://schemas.microsoft.com/office/drawing/2014/main" id="{79845A40-9D1A-4ACA-A962-10F5951E4C90}"/>
+              </a:ext>
+            </a:extLst>
+          </p:cNvPr>
+          <p:cNvSpPr/>
+          <p:nvPr/>
+        </p:nvSpPr>
+        <p:spPr>
+          <a:xfrm>
+            <a:off x="1632725" y="5999355"/>
+            <a:ext cx="579864" cy="549697"/>
+          </a:xfrm>
+          <a:prstGeom prst="rect">
+            <a:avLst/>
+          </a:prstGeom>
+          <a:solidFill>
+            <a:srgbClr val="FBBB4D"/>
+          </a:solidFill>
+          <a:ln>
+            <a:noFill/>
+          </a:ln>
+        </p:spPr>
+        <p:style>
+          <a:lnRef idx="2">
+            <a:schemeClr val="accent1">
+              <a:shade val="50000"/>
+            </a:schemeClr>
+          </a:lnRef>
+          <a:fillRef idx="1">
+            <a:schemeClr val="accent1"/>
+          </a:fillRef>
+          <a:effectRef idx="0">
+            <a:schemeClr val="accent1"/>
+          </a:effectRef>
+          <a:fontRef idx="minor">
+            <a:schemeClr val="lt1"/>
+          </a:fontRef>
+        </p:style>
+        <p:txBody>
+          <a:bodyPr rtlCol="0" anchor="ctr"/>
+          <a:lstStyle/>
+          <a:p>
+            <a:pPr algn="ctr"/>
+            <a:endParaRPr lang="en-US"/>
+          </a:p>
+        </p:txBody>
+      </p:sp>
+      <p:sp>
+        <p:nvSpPr>
+          <p:cNvPr id="23" name="Rectangle 22">
+            <a:extLst>
+              <a:ext uri="{FF2B5EF4-FFF2-40B4-BE49-F238E27FC236}">
+                <a16:creationId xmlns:a16="http://schemas.microsoft.com/office/drawing/2014/main" id="{AE59CE73-14E3-4608-A356-D2119519506E}"/>
+              </a:ext>
+            </a:extLst>
+          </p:cNvPr>
+          <p:cNvSpPr/>
+          <p:nvPr/>
+        </p:nvSpPr>
+        <p:spPr>
+          <a:xfrm>
+            <a:off x="2663284" y="5999355"/>
+            <a:ext cx="579864" cy="549697"/>
+          </a:xfrm>
+          <a:prstGeom prst="rect">
+            <a:avLst/>
+          </a:prstGeom>
+          <a:solidFill>
+            <a:srgbClr val="3EC451"/>
+          </a:solidFill>
+          <a:ln>
+            <a:noFill/>
+          </a:ln>
+        </p:spPr>
+        <p:style>
+          <a:lnRef idx="2">
+            <a:schemeClr val="accent1">
+              <a:shade val="50000"/>
+            </a:schemeClr>
+          </a:lnRef>
+          <a:fillRef idx="1">
+            <a:schemeClr val="accent1"/>
+          </a:fillRef>
+          <a:effectRef idx="0">
+            <a:schemeClr val="accent1"/>
+          </a:effectRef>
+          <a:fontRef idx="minor">
+            <a:schemeClr val="lt1"/>
+          </a:fontRef>
+        </p:style>
+        <p:txBody>
+          <a:bodyPr rtlCol="0" anchor="ctr"/>
+          <a:lstStyle/>
+          <a:p>
+            <a:pPr algn="ctr"/>
+            <a:endParaRPr lang="en-US" dirty="0"/>
+          </a:p>
+        </p:txBody>
+      </p:sp>
+      <p:sp>
+        <p:nvSpPr>
+          <p:cNvPr id="24" name="Rectangle 23">
+            <a:extLst>
+              <a:ext uri="{FF2B5EF4-FFF2-40B4-BE49-F238E27FC236}">
+                <a16:creationId xmlns:a16="http://schemas.microsoft.com/office/drawing/2014/main" id="{C079055C-121E-4026-A811-3915394804C6}"/>
+              </a:ext>
+            </a:extLst>
+          </p:cNvPr>
+          <p:cNvSpPr/>
+          <p:nvPr/>
+        </p:nvSpPr>
+        <p:spPr>
+          <a:xfrm>
+            <a:off x="3693843" y="5999355"/>
+            <a:ext cx="579864" cy="549697"/>
+          </a:xfrm>
+          <a:prstGeom prst="rect">
+            <a:avLst/>
+          </a:prstGeom>
+          <a:solidFill>
+            <a:srgbClr val="4BB8F3"/>
+          </a:solidFill>
+          <a:ln>
+            <a:noFill/>
+          </a:ln>
+        </p:spPr>
+        <p:style>
+          <a:lnRef idx="2">
+            <a:schemeClr val="accent1">
+              <a:shade val="50000"/>
+            </a:schemeClr>
+          </a:lnRef>
+          <a:fillRef idx="1">
+            <a:schemeClr val="accent1"/>
+          </a:fillRef>
+          <a:effectRef idx="0">
+            <a:schemeClr val="accent1"/>
+          </a:effectRef>
+          <a:fontRef idx="minor">
+            <a:schemeClr val="lt1"/>
+          </a:fontRef>
+        </p:style>
+        <p:txBody>
+          <a:bodyPr rtlCol="0" anchor="ctr"/>
+          <a:lstStyle/>
+          <a:p>
+            <a:pPr algn="ctr"/>
+            <a:endParaRPr lang="en-US"/>
+          </a:p>
+        </p:txBody>
+      </p:sp>
+      <p:sp>
+        <p:nvSpPr>
+          <p:cNvPr id="25" name="Rectangle 24">
+            <a:extLst>
+              <a:ext uri="{FF2B5EF4-FFF2-40B4-BE49-F238E27FC236}">
+                <a16:creationId xmlns:a16="http://schemas.microsoft.com/office/drawing/2014/main" id="{45614592-593B-4CFE-8347-B5BE830FF4F9}"/>
+              </a:ext>
+            </a:extLst>
+          </p:cNvPr>
+          <p:cNvSpPr/>
+          <p:nvPr/>
+        </p:nvSpPr>
+        <p:spPr>
+          <a:xfrm>
+            <a:off x="602166" y="5211290"/>
+            <a:ext cx="579864" cy="549697"/>
+          </a:xfrm>
+          <a:prstGeom prst="rect">
+            <a:avLst/>
+          </a:prstGeom>
+          <a:solidFill>
+            <a:srgbClr val="AD3B46"/>
+          </a:solidFill>
+          <a:ln>
+            <a:noFill/>
+          </a:ln>
+        </p:spPr>
+        <p:style>
+          <a:lnRef idx="2">
+            <a:schemeClr val="accent1">
+              <a:shade val="50000"/>
+            </a:schemeClr>
+          </a:lnRef>
+          <a:fillRef idx="1">
+            <a:schemeClr val="accent1"/>
+          </a:fillRef>
+          <a:effectRef idx="0">
+            <a:schemeClr val="accent1"/>
+          </a:effectRef>
+          <a:fontRef idx="minor">
+            <a:schemeClr val="lt1"/>
+          </a:fontRef>
+        </p:style>
+        <p:txBody>
+          <a:bodyPr rtlCol="0" anchor="ctr"/>
+          <a:lstStyle/>
+          <a:p>
+            <a:pPr algn="ctr"/>
+            <a:endParaRPr lang="en-US"/>
+          </a:p>
+        </p:txBody>
+      </p:sp>
+      <p:sp>
+        <p:nvSpPr>
+          <p:cNvPr id="26" name="Rectangle 25">
+            <a:extLst>
+              <a:ext uri="{FF2B5EF4-FFF2-40B4-BE49-F238E27FC236}">
+                <a16:creationId xmlns:a16="http://schemas.microsoft.com/office/drawing/2014/main" id="{0D8FEDAB-4912-4330-AE2E-DD704246BCFA}"/>
+              </a:ext>
+            </a:extLst>
+          </p:cNvPr>
+          <p:cNvSpPr/>
+          <p:nvPr/>
+        </p:nvSpPr>
+        <p:spPr>
+          <a:xfrm>
+            <a:off x="1632725" y="5211290"/>
+            <a:ext cx="579864" cy="549697"/>
+          </a:xfrm>
+          <a:prstGeom prst="rect">
+            <a:avLst/>
+          </a:prstGeom>
+          <a:solidFill>
+            <a:srgbClr val="E2A74E"/>
+          </a:solidFill>
+          <a:ln>
+            <a:noFill/>
+          </a:ln>
+        </p:spPr>
+        <p:style>
+          <a:lnRef idx="2">
+            <a:schemeClr val="accent1">
+              <a:shade val="50000"/>
+            </a:schemeClr>
+          </a:lnRef>
+          <a:fillRef idx="1">
+            <a:schemeClr val="accent1"/>
+          </a:fillRef>
+          <a:effectRef idx="0">
+            <a:schemeClr val="accent1"/>
+          </a:effectRef>
+          <a:fontRef idx="minor">
+            <a:schemeClr val="lt1"/>
+          </a:fontRef>
+        </p:style>
+        <p:txBody>
+          <a:bodyPr rtlCol="0" anchor="ctr"/>
+          <a:lstStyle/>
+          <a:p>
+            <a:pPr algn="ctr"/>
+            <a:endParaRPr lang="en-US"/>
+          </a:p>
+        </p:txBody>
+      </p:sp>
+      <p:sp>
+        <p:nvSpPr>
+          <p:cNvPr id="27" name="Rectangle 26">
+            <a:extLst>
+              <a:ext uri="{FF2B5EF4-FFF2-40B4-BE49-F238E27FC236}">
+                <a16:creationId xmlns:a16="http://schemas.microsoft.com/office/drawing/2014/main" id="{33C22092-C1D7-4058-AC84-7897F51E4B08}"/>
+              </a:ext>
+            </a:extLst>
+          </p:cNvPr>
+          <p:cNvSpPr/>
+          <p:nvPr/>
+        </p:nvSpPr>
+        <p:spPr>
+          <a:xfrm>
+            <a:off x="2663284" y="5211290"/>
+            <a:ext cx="579864" cy="549697"/>
+          </a:xfrm>
+          <a:prstGeom prst="rect">
+            <a:avLst/>
+          </a:prstGeom>
+          <a:solidFill>
+            <a:srgbClr val="33AB40"/>
+          </a:solidFill>
+          <a:ln>
+            <a:noFill/>
+          </a:ln>
+        </p:spPr>
+        <p:style>
+          <a:lnRef idx="2">
+            <a:schemeClr val="accent1">
+              <a:shade val="50000"/>
+            </a:schemeClr>
+          </a:lnRef>
+          <a:fillRef idx="1">
+            <a:schemeClr val="accent1"/>
+          </a:fillRef>
+          <a:effectRef idx="0">
+            <a:schemeClr val="accent1"/>
+          </a:effectRef>
+          <a:fontRef idx="minor">
+            <a:schemeClr val="lt1"/>
+          </a:fontRef>
+        </p:style>
+        <p:txBody>
+          <a:bodyPr rtlCol="0" anchor="ctr"/>
+          <a:lstStyle/>
+          <a:p>
+            <a:pPr algn="ctr"/>
+            <a:endParaRPr lang="en-US" dirty="0"/>
+          </a:p>
+        </p:txBody>
+      </p:sp>
+      <p:sp>
+        <p:nvSpPr>
+          <p:cNvPr id="28" name="Rectangle 27">
+            <a:extLst>
+              <a:ext uri="{FF2B5EF4-FFF2-40B4-BE49-F238E27FC236}">
+                <a16:creationId xmlns:a16="http://schemas.microsoft.com/office/drawing/2014/main" id="{87B84CB9-28BC-4B7A-B402-58B998C86C8D}"/>
+              </a:ext>
+            </a:extLst>
+          </p:cNvPr>
+          <p:cNvSpPr/>
+          <p:nvPr/>
+        </p:nvSpPr>
+        <p:spPr>
+          <a:xfrm>
+            <a:off x="3693843" y="5193050"/>
+            <a:ext cx="579864" cy="549697"/>
+          </a:xfrm>
+          <a:prstGeom prst="rect">
+            <a:avLst/>
+          </a:prstGeom>
+          <a:solidFill>
+            <a:srgbClr val="44A0D4"/>
+          </a:solidFill>
+          <a:ln>
+            <a:noFill/>
+          </a:ln>
+        </p:spPr>
+        <p:style>
+          <a:lnRef idx="2">
+            <a:schemeClr val="accent1">
+              <a:shade val="50000"/>
+            </a:schemeClr>
+          </a:lnRef>
+          <a:fillRef idx="1">
+            <a:schemeClr val="accent1"/>
+          </a:fillRef>
+          <a:effectRef idx="0">
+            <a:schemeClr val="accent1"/>
+          </a:effectRef>
+          <a:fontRef idx="minor">
+            <a:schemeClr val="lt1"/>
+          </a:fontRef>
+        </p:style>
+        <p:txBody>
+          <a:bodyPr rtlCol="0" anchor="ctr"/>
+          <a:lstStyle/>
+          <a:p>
+            <a:pPr algn="ctr"/>
+            <a:endParaRPr lang="en-US"/>
+          </a:p>
+        </p:txBody>
+      </p:sp>
+      <p:grpSp>
+        <p:nvGrpSpPr>
+          <p:cNvPr id="33" name="Group 32">
+            <a:extLst>
+              <a:ext uri="{FF2B5EF4-FFF2-40B4-BE49-F238E27FC236}">
+                <a16:creationId xmlns:a16="http://schemas.microsoft.com/office/drawing/2014/main" id="{97CC8FC9-AF57-8ACA-3113-17A75D0C82DA}"/>
+              </a:ext>
+            </a:extLst>
+          </p:cNvPr>
+          <p:cNvGrpSpPr/>
+          <p:nvPr/>
+        </p:nvGrpSpPr>
+        <p:grpSpPr>
+          <a:xfrm>
+            <a:off x="4631721" y="1983988"/>
+            <a:ext cx="2928558" cy="2890024"/>
+            <a:chOff x="4631721" y="1983988"/>
+            <a:chExt cx="2928558" cy="2890024"/>
+          </a:xfrm>
+        </p:grpSpPr>
+        <p:sp>
+          <p:nvSpPr>
+            <p:cNvPr id="4" name="Oval 3">
+              <a:extLst>
+                <a:ext uri="{FF2B5EF4-FFF2-40B4-BE49-F238E27FC236}">
+                  <a16:creationId xmlns:a16="http://schemas.microsoft.com/office/drawing/2014/main" id="{BFA83157-7024-45C1-85FC-67F98FA6164D}"/>
+                </a:ext>
+              </a:extLst>
+            </p:cNvPr>
+            <p:cNvSpPr/>
+            <p:nvPr/>
+          </p:nvSpPr>
+          <p:spPr>
+            <a:xfrm rot="2691303">
+              <a:off x="4631721" y="1983988"/>
+              <a:ext cx="2928558" cy="2890024"/>
+            </a:xfrm>
+            <a:prstGeom prst="ellipse">
+              <a:avLst/>
+            </a:prstGeom>
+            <a:solidFill>
+              <a:srgbClr val="AD3B46"/>
+            </a:solidFill>
+            <a:ln w="57150">
+              <a:solidFill>
+                <a:srgbClr val="AD3B46"/>
+              </a:solidFill>
+            </a:ln>
+          </p:spPr>
+          <p:style>
+            <a:lnRef idx="2">
+              <a:schemeClr val="accent1">
+                <a:shade val="50000"/>
+              </a:schemeClr>
+            </a:lnRef>
+            <a:fillRef idx="1">
+              <a:schemeClr val="accent1"/>
+            </a:fillRef>
+            <a:effectRef idx="0">
+              <a:schemeClr val="accent1"/>
+            </a:effectRef>
+            <a:fontRef idx="minor">
+              <a:schemeClr val="lt1"/>
+            </a:fontRef>
+          </p:style>
+          <p:txBody>
+            <a:bodyPr rtlCol="0" anchor="ctr"/>
+            <a:lstStyle/>
+            <a:p>
+              <a:pPr algn="ctr"/>
+              <a:endParaRPr lang="en-US"/>
+            </a:p>
+          </p:txBody>
+        </p:sp>
+        <p:sp>
+          <p:nvSpPr>
+            <p:cNvPr id="29" name="Rectangle: Rounded Corners 28">
+              <a:extLst>
+                <a:ext uri="{FF2B5EF4-FFF2-40B4-BE49-F238E27FC236}">
+                  <a16:creationId xmlns:a16="http://schemas.microsoft.com/office/drawing/2014/main" id="{CF5670BB-CF33-EDAE-2F56-098DF1927E42}"/>
+                </a:ext>
+              </a:extLst>
+            </p:cNvPr>
+            <p:cNvSpPr/>
+            <p:nvPr/>
+          </p:nvSpPr>
+          <p:spPr>
+            <a:xfrm rot="2727814">
+              <a:off x="5896016" y="2637481"/>
+              <a:ext cx="365760" cy="1644542"/>
+            </a:xfrm>
+            <a:prstGeom prst="roundRect">
+              <a:avLst>
+                <a:gd name="adj" fmla="val 50000"/>
+              </a:avLst>
+            </a:prstGeom>
+            <a:solidFill>
+              <a:srgbClr val="1C2028"/>
+            </a:solidFill>
+            <a:ln>
+              <a:noFill/>
+            </a:ln>
+          </p:spPr>
+          <p:style>
+            <a:lnRef idx="2">
+              <a:schemeClr val="accent1">
+                <a:shade val="50000"/>
+              </a:schemeClr>
+            </a:lnRef>
+            <a:fillRef idx="1">
+              <a:schemeClr val="accent1"/>
+            </a:fillRef>
+            <a:effectRef idx="0">
+              <a:schemeClr val="accent1"/>
+            </a:effectRef>
+            <a:fontRef idx="minor">
+              <a:schemeClr val="lt1"/>
+            </a:fontRef>
+          </p:style>
+          <p:txBody>
+            <a:bodyPr rtlCol="0" anchor="ctr"/>
+            <a:lstStyle/>
+            <a:p>
+              <a:pPr algn="ctr"/>
+              <a:endParaRPr lang="en-US"/>
+            </a:p>
+          </p:txBody>
+        </p:sp>
+        <p:sp>
+          <p:nvSpPr>
+            <p:cNvPr id="30" name="Rectangle: Rounded Corners 29">
+              <a:extLst>
+                <a:ext uri="{FF2B5EF4-FFF2-40B4-BE49-F238E27FC236}">
+                  <a16:creationId xmlns:a16="http://schemas.microsoft.com/office/drawing/2014/main" id="{BE74946D-0DD1-BE7A-A965-6AA99A0701AD}"/>
+                </a:ext>
+              </a:extLst>
+            </p:cNvPr>
+            <p:cNvSpPr/>
+            <p:nvPr/>
+          </p:nvSpPr>
+          <p:spPr>
+            <a:xfrm rot="18868349">
+              <a:off x="5896016" y="2636968"/>
+              <a:ext cx="365760" cy="1644542"/>
+            </a:xfrm>
+            <a:prstGeom prst="roundRect">
+              <a:avLst>
+                <a:gd name="adj" fmla="val 50000"/>
+              </a:avLst>
+            </a:prstGeom>
+            <a:solidFill>
+              <a:srgbClr val="1C2028"/>
+            </a:solidFill>
+            <a:ln>
+              <a:noFill/>
+            </a:ln>
+          </p:spPr>
+          <p:style>
+            <a:lnRef idx="2">
+              <a:schemeClr val="accent1">
+                <a:shade val="50000"/>
+              </a:schemeClr>
+            </a:lnRef>
+            <a:fillRef idx="1">
+              <a:schemeClr val="accent1"/>
+            </a:fillRef>
+            <a:effectRef idx="0">
+              <a:schemeClr val="accent1"/>
+            </a:effectRef>
+            <a:fontRef idx="minor">
+              <a:schemeClr val="lt1"/>
+            </a:fontRef>
+          </p:style>
+          <p:txBody>
+            <a:bodyPr rtlCol="0" anchor="ctr"/>
+            <a:lstStyle/>
+            <a:p>
+              <a:pPr algn="ctr"/>
+              <a:endParaRPr lang="en-US"/>
+            </a:p>
+          </p:txBody>
+        </p:sp>
+      </p:grpSp>
+    </p:spTree>
+    <p:extLst>
+      <p:ext uri="{BB962C8B-B14F-4D97-AF65-F5344CB8AC3E}">
+        <p14:creationId xmlns:p14="http://schemas.microsoft.com/office/powerpoint/2010/main" val="3425350126"/>
+      </p:ext>
+    </p:extLst>
+  </p:cSld>
+  <p:clrMapOvr>
+    <a:masterClrMapping/>
+  </p:clrMapOvr>
+</p:sld>
+</file>
+
+<file path=ppt/slides/slide14.xml><?xml version="1.0" encoding="utf-8"?>
+<p:sld xmlns:a="http://schemas.openxmlformats.org/drawingml/2006/main" xmlns:r="http://schemas.openxmlformats.org/officeDocument/2006/relationships" xmlns:p="http://schemas.openxmlformats.org/presentationml/2006/main">
+  <p:cSld>
+    <p:spTree>
+      <p:nvGrpSpPr>
+        <p:cNvPr id="1" name=""/>
+        <p:cNvGrpSpPr/>
+        <p:nvPr/>
+      </p:nvGrpSpPr>
+      <p:grpSpPr>
+        <a:xfrm>
+          <a:off x="0" y="0"/>
+          <a:ext cx="0" cy="0"/>
+          <a:chOff x="0" y="0"/>
+          <a:chExt cx="0" cy="0"/>
+        </a:xfrm>
+      </p:grpSpPr>
+      <p:sp>
+        <p:nvSpPr>
+          <p:cNvPr id="5" name="Rectangle 4">
+            <a:extLst>
+              <a:ext uri="{FF2B5EF4-FFF2-40B4-BE49-F238E27FC236}">
+                <a16:creationId xmlns:a16="http://schemas.microsoft.com/office/drawing/2014/main" id="{F061ACAB-424F-4501-97F7-30C21D0EA7A1}"/>
+              </a:ext>
+            </a:extLst>
+          </p:cNvPr>
+          <p:cNvSpPr/>
+          <p:nvPr/>
+        </p:nvSpPr>
+        <p:spPr>
+          <a:xfrm>
+            <a:off x="602166" y="5999356"/>
+            <a:ext cx="579864" cy="549697"/>
+          </a:xfrm>
+          <a:prstGeom prst="rect">
+            <a:avLst/>
+          </a:prstGeom>
+          <a:solidFill>
+            <a:srgbClr val="F96160"/>
+          </a:solidFill>
+          <a:ln>
+            <a:noFill/>
+          </a:ln>
+        </p:spPr>
+        <p:style>
+          <a:lnRef idx="2">
+            <a:schemeClr val="accent1">
+              <a:shade val="50000"/>
+            </a:schemeClr>
+          </a:lnRef>
+          <a:fillRef idx="1">
+            <a:schemeClr val="accent1"/>
+          </a:fillRef>
+          <a:effectRef idx="0">
+            <a:schemeClr val="accent1"/>
+          </a:effectRef>
+          <a:fontRef idx="minor">
+            <a:schemeClr val="lt1"/>
+          </a:fontRef>
+        </p:style>
+        <p:txBody>
+          <a:bodyPr rtlCol="0" anchor="ctr"/>
+          <a:lstStyle/>
+          <a:p>
+            <a:pPr algn="ctr"/>
+            <a:endParaRPr lang="en-US"/>
+          </a:p>
+        </p:txBody>
+      </p:sp>
+      <p:sp>
+        <p:nvSpPr>
+          <p:cNvPr id="7" name="Rectangle 6">
+            <a:extLst>
+              <a:ext uri="{FF2B5EF4-FFF2-40B4-BE49-F238E27FC236}">
+                <a16:creationId xmlns:a16="http://schemas.microsoft.com/office/drawing/2014/main" id="{CCB2303E-C712-4CC7-A07E-30C89AA6C536}"/>
+              </a:ext>
+            </a:extLst>
+          </p:cNvPr>
+          <p:cNvSpPr/>
+          <p:nvPr/>
+        </p:nvSpPr>
+        <p:spPr>
+          <a:xfrm>
+            <a:off x="1632725" y="5999355"/>
+            <a:ext cx="579864" cy="549697"/>
+          </a:xfrm>
+          <a:prstGeom prst="rect">
+            <a:avLst/>
+          </a:prstGeom>
+          <a:solidFill>
+            <a:srgbClr val="FBBB4D"/>
+          </a:solidFill>
+          <a:ln>
+            <a:noFill/>
+          </a:ln>
+        </p:spPr>
+        <p:style>
+          <a:lnRef idx="2">
+            <a:schemeClr val="accent1">
+              <a:shade val="50000"/>
+            </a:schemeClr>
+          </a:lnRef>
+          <a:fillRef idx="1">
+            <a:schemeClr val="accent1"/>
+          </a:fillRef>
+          <a:effectRef idx="0">
+            <a:schemeClr val="accent1"/>
+          </a:effectRef>
+          <a:fontRef idx="minor">
+            <a:schemeClr val="lt1"/>
+          </a:fontRef>
+        </p:style>
+        <p:txBody>
+          <a:bodyPr rtlCol="0" anchor="ctr"/>
+          <a:lstStyle/>
+          <a:p>
+            <a:pPr algn="ctr"/>
+            <a:endParaRPr lang="en-US"/>
+          </a:p>
+        </p:txBody>
+      </p:sp>
+      <p:sp>
+        <p:nvSpPr>
+          <p:cNvPr id="8" name="Rectangle 7">
+            <a:extLst>
+              <a:ext uri="{FF2B5EF4-FFF2-40B4-BE49-F238E27FC236}">
+                <a16:creationId xmlns:a16="http://schemas.microsoft.com/office/drawing/2014/main" id="{5D372310-AF1C-41DC-90C3-5A0D1E14266A}"/>
+              </a:ext>
+            </a:extLst>
+          </p:cNvPr>
+          <p:cNvSpPr/>
+          <p:nvPr/>
+        </p:nvSpPr>
+        <p:spPr>
+          <a:xfrm>
+            <a:off x="2663284" y="5999355"/>
+            <a:ext cx="579864" cy="549697"/>
+          </a:xfrm>
+          <a:prstGeom prst="rect">
+            <a:avLst/>
+          </a:prstGeom>
+          <a:solidFill>
+            <a:srgbClr val="3EC451"/>
+          </a:solidFill>
+          <a:ln>
+            <a:noFill/>
+          </a:ln>
+        </p:spPr>
+        <p:style>
+          <a:lnRef idx="2">
+            <a:schemeClr val="accent1">
+              <a:shade val="50000"/>
+            </a:schemeClr>
+          </a:lnRef>
+          <a:fillRef idx="1">
+            <a:schemeClr val="accent1"/>
+          </a:fillRef>
+          <a:effectRef idx="0">
+            <a:schemeClr val="accent1"/>
+          </a:effectRef>
+          <a:fontRef idx="minor">
+            <a:schemeClr val="lt1"/>
+          </a:fontRef>
+        </p:style>
+        <p:txBody>
+          <a:bodyPr rtlCol="0" anchor="ctr"/>
+          <a:lstStyle/>
+          <a:p>
+            <a:pPr algn="ctr"/>
+            <a:endParaRPr lang="en-US" dirty="0"/>
+          </a:p>
+        </p:txBody>
+      </p:sp>
+      <p:sp>
+        <p:nvSpPr>
+          <p:cNvPr id="9" name="Rectangle 8">
+            <a:extLst>
+              <a:ext uri="{FF2B5EF4-FFF2-40B4-BE49-F238E27FC236}">
+                <a16:creationId xmlns:a16="http://schemas.microsoft.com/office/drawing/2014/main" id="{C59D9ACE-0F71-4801-AEA0-AA357C2034E7}"/>
+              </a:ext>
+            </a:extLst>
+          </p:cNvPr>
+          <p:cNvSpPr/>
+          <p:nvPr/>
+        </p:nvSpPr>
+        <p:spPr>
+          <a:xfrm>
+            <a:off x="3693843" y="5999355"/>
+            <a:ext cx="579864" cy="549697"/>
+          </a:xfrm>
+          <a:prstGeom prst="rect">
+            <a:avLst/>
+          </a:prstGeom>
+          <a:solidFill>
+            <a:srgbClr val="4BB8F3"/>
+          </a:solidFill>
+          <a:ln>
+            <a:noFill/>
+          </a:ln>
+        </p:spPr>
+        <p:style>
+          <a:lnRef idx="2">
+            <a:schemeClr val="accent1">
+              <a:shade val="50000"/>
+            </a:schemeClr>
+          </a:lnRef>
+          <a:fillRef idx="1">
+            <a:schemeClr val="accent1"/>
+          </a:fillRef>
+          <a:effectRef idx="0">
+            <a:schemeClr val="accent1"/>
+          </a:effectRef>
+          <a:fontRef idx="minor">
+            <a:schemeClr val="lt1"/>
+          </a:fontRef>
+        </p:style>
+        <p:txBody>
+          <a:bodyPr rtlCol="0" anchor="ctr"/>
+          <a:lstStyle/>
+          <a:p>
+            <a:pPr algn="ctr"/>
+            <a:endParaRPr lang="en-US"/>
+          </a:p>
+        </p:txBody>
+      </p:sp>
+      <p:sp>
+        <p:nvSpPr>
+          <p:cNvPr id="13" name="Rectangle 12">
+            <a:extLst>
+              <a:ext uri="{FF2B5EF4-FFF2-40B4-BE49-F238E27FC236}">
+                <a16:creationId xmlns:a16="http://schemas.microsoft.com/office/drawing/2014/main" id="{A4AF4B1F-0B61-4962-B93C-3A917575583C}"/>
+              </a:ext>
+            </a:extLst>
+          </p:cNvPr>
+          <p:cNvSpPr/>
+          <p:nvPr/>
+        </p:nvSpPr>
+        <p:spPr>
+          <a:xfrm>
+            <a:off x="4724402" y="5999355"/>
+            <a:ext cx="579864" cy="549697"/>
+          </a:xfrm>
+          <a:prstGeom prst="rect">
+            <a:avLst/>
+          </a:prstGeom>
+          <a:solidFill>
+            <a:srgbClr val="161A21"/>
+          </a:solidFill>
+          <a:ln>
+            <a:noFill/>
+          </a:ln>
+        </p:spPr>
+        <p:style>
+          <a:lnRef idx="2">
+            <a:schemeClr val="accent1">
+              <a:shade val="50000"/>
+            </a:schemeClr>
+          </a:lnRef>
+          <a:fillRef idx="1">
+            <a:schemeClr val="accent1"/>
+          </a:fillRef>
+          <a:effectRef idx="0">
+            <a:schemeClr val="accent1"/>
+          </a:effectRef>
+          <a:fontRef idx="minor">
+            <a:schemeClr val="lt1"/>
+          </a:fontRef>
+        </p:style>
+        <p:txBody>
+          <a:bodyPr rtlCol="0" anchor="ctr"/>
+          <a:lstStyle/>
+          <a:p>
+            <a:pPr algn="ctr"/>
+            <a:endParaRPr lang="en-US"/>
+          </a:p>
+        </p:txBody>
+      </p:sp>
+      <p:sp>
+        <p:nvSpPr>
+          <p:cNvPr id="21" name="Rectangle 20">
+            <a:extLst>
+              <a:ext uri="{FF2B5EF4-FFF2-40B4-BE49-F238E27FC236}">
+                <a16:creationId xmlns:a16="http://schemas.microsoft.com/office/drawing/2014/main" id="{C9527B53-C5C5-409E-9633-74903E8F3DAA}"/>
+              </a:ext>
+            </a:extLst>
+          </p:cNvPr>
+          <p:cNvSpPr/>
+          <p:nvPr/>
+        </p:nvSpPr>
+        <p:spPr>
+          <a:xfrm>
+            <a:off x="602166" y="5999356"/>
+            <a:ext cx="579864" cy="549697"/>
+          </a:xfrm>
+          <a:prstGeom prst="rect">
+            <a:avLst/>
+          </a:prstGeom>
+          <a:solidFill>
+            <a:srgbClr val="F96160"/>
+          </a:solidFill>
+          <a:ln>
+            <a:noFill/>
+          </a:ln>
+        </p:spPr>
+        <p:style>
+          <a:lnRef idx="2">
+            <a:schemeClr val="accent1">
+              <a:shade val="50000"/>
+            </a:schemeClr>
+          </a:lnRef>
+          <a:fillRef idx="1">
+            <a:schemeClr val="accent1"/>
+          </a:fillRef>
+          <a:effectRef idx="0">
+            <a:schemeClr val="accent1"/>
+          </a:effectRef>
+          <a:fontRef idx="minor">
+            <a:schemeClr val="lt1"/>
+          </a:fontRef>
+        </p:style>
+        <p:txBody>
+          <a:bodyPr rtlCol="0" anchor="ctr"/>
+          <a:lstStyle/>
+          <a:p>
+            <a:pPr algn="ctr"/>
+            <a:endParaRPr lang="en-US"/>
+          </a:p>
+        </p:txBody>
+      </p:sp>
+      <p:sp>
+        <p:nvSpPr>
+          <p:cNvPr id="22" name="Rectangle 21">
+            <a:extLst>
+              <a:ext uri="{FF2B5EF4-FFF2-40B4-BE49-F238E27FC236}">
+                <a16:creationId xmlns:a16="http://schemas.microsoft.com/office/drawing/2014/main" id="{79845A40-9D1A-4ACA-A962-10F5951E4C90}"/>
+              </a:ext>
+            </a:extLst>
+          </p:cNvPr>
+          <p:cNvSpPr/>
+          <p:nvPr/>
+        </p:nvSpPr>
+        <p:spPr>
+          <a:xfrm>
+            <a:off x="1632725" y="5999355"/>
+            <a:ext cx="579864" cy="549697"/>
+          </a:xfrm>
+          <a:prstGeom prst="rect">
+            <a:avLst/>
+          </a:prstGeom>
+          <a:solidFill>
+            <a:srgbClr val="FBBB4D"/>
+          </a:solidFill>
+          <a:ln>
+            <a:noFill/>
+          </a:ln>
+        </p:spPr>
+        <p:style>
+          <a:lnRef idx="2">
+            <a:schemeClr val="accent1">
+              <a:shade val="50000"/>
+            </a:schemeClr>
+          </a:lnRef>
+          <a:fillRef idx="1">
+            <a:schemeClr val="accent1"/>
+          </a:fillRef>
+          <a:effectRef idx="0">
+            <a:schemeClr val="accent1"/>
+          </a:effectRef>
+          <a:fontRef idx="minor">
+            <a:schemeClr val="lt1"/>
+          </a:fontRef>
+        </p:style>
+        <p:txBody>
+          <a:bodyPr rtlCol="0" anchor="ctr"/>
+          <a:lstStyle/>
+          <a:p>
+            <a:pPr algn="ctr"/>
+            <a:endParaRPr lang="en-US"/>
+          </a:p>
+        </p:txBody>
+      </p:sp>
+      <p:sp>
+        <p:nvSpPr>
+          <p:cNvPr id="23" name="Rectangle 22">
+            <a:extLst>
+              <a:ext uri="{FF2B5EF4-FFF2-40B4-BE49-F238E27FC236}">
+                <a16:creationId xmlns:a16="http://schemas.microsoft.com/office/drawing/2014/main" id="{AE59CE73-14E3-4608-A356-D2119519506E}"/>
+              </a:ext>
+            </a:extLst>
+          </p:cNvPr>
+          <p:cNvSpPr/>
+          <p:nvPr/>
+        </p:nvSpPr>
+        <p:spPr>
+          <a:xfrm>
+            <a:off x="2663284" y="5999355"/>
+            <a:ext cx="579864" cy="549697"/>
+          </a:xfrm>
+          <a:prstGeom prst="rect">
+            <a:avLst/>
+          </a:prstGeom>
+          <a:solidFill>
+            <a:srgbClr val="3EC451"/>
+          </a:solidFill>
+          <a:ln>
+            <a:noFill/>
+          </a:ln>
+        </p:spPr>
+        <p:style>
+          <a:lnRef idx="2">
+            <a:schemeClr val="accent1">
+              <a:shade val="50000"/>
+            </a:schemeClr>
+          </a:lnRef>
+          <a:fillRef idx="1">
+            <a:schemeClr val="accent1"/>
+          </a:fillRef>
+          <a:effectRef idx="0">
+            <a:schemeClr val="accent1"/>
+          </a:effectRef>
+          <a:fontRef idx="minor">
+            <a:schemeClr val="lt1"/>
+          </a:fontRef>
+        </p:style>
+        <p:txBody>
+          <a:bodyPr rtlCol="0" anchor="ctr"/>
+          <a:lstStyle/>
+          <a:p>
+            <a:pPr algn="ctr"/>
+            <a:endParaRPr lang="en-US" dirty="0"/>
+          </a:p>
+        </p:txBody>
+      </p:sp>
+      <p:sp>
+        <p:nvSpPr>
+          <p:cNvPr id="24" name="Rectangle 23">
+            <a:extLst>
+              <a:ext uri="{FF2B5EF4-FFF2-40B4-BE49-F238E27FC236}">
+                <a16:creationId xmlns:a16="http://schemas.microsoft.com/office/drawing/2014/main" id="{C079055C-121E-4026-A811-3915394804C6}"/>
+              </a:ext>
+            </a:extLst>
+          </p:cNvPr>
+          <p:cNvSpPr/>
+          <p:nvPr/>
+        </p:nvSpPr>
+        <p:spPr>
+          <a:xfrm>
+            <a:off x="3693843" y="5999355"/>
+            <a:ext cx="579864" cy="549697"/>
+          </a:xfrm>
+          <a:prstGeom prst="rect">
+            <a:avLst/>
+          </a:prstGeom>
+          <a:solidFill>
+            <a:srgbClr val="4BB8F3"/>
+          </a:solidFill>
+          <a:ln>
+            <a:noFill/>
+          </a:ln>
+        </p:spPr>
+        <p:style>
+          <a:lnRef idx="2">
+            <a:schemeClr val="accent1">
+              <a:shade val="50000"/>
+            </a:schemeClr>
+          </a:lnRef>
+          <a:fillRef idx="1">
+            <a:schemeClr val="accent1"/>
+          </a:fillRef>
+          <a:effectRef idx="0">
+            <a:schemeClr val="accent1"/>
+          </a:effectRef>
+          <a:fontRef idx="minor">
+            <a:schemeClr val="lt1"/>
+          </a:fontRef>
+        </p:style>
+        <p:txBody>
+          <a:bodyPr rtlCol="0" anchor="ctr"/>
+          <a:lstStyle/>
+          <a:p>
+            <a:pPr algn="ctr"/>
+            <a:endParaRPr lang="en-US"/>
+          </a:p>
+        </p:txBody>
+      </p:sp>
+      <p:sp>
+        <p:nvSpPr>
+          <p:cNvPr id="25" name="Rectangle 24">
+            <a:extLst>
+              <a:ext uri="{FF2B5EF4-FFF2-40B4-BE49-F238E27FC236}">
+                <a16:creationId xmlns:a16="http://schemas.microsoft.com/office/drawing/2014/main" id="{45614592-593B-4CFE-8347-B5BE830FF4F9}"/>
+              </a:ext>
+            </a:extLst>
+          </p:cNvPr>
+          <p:cNvSpPr/>
+          <p:nvPr/>
+        </p:nvSpPr>
+        <p:spPr>
+          <a:xfrm>
+            <a:off x="602166" y="5211290"/>
+            <a:ext cx="579864" cy="549697"/>
+          </a:xfrm>
+          <a:prstGeom prst="rect">
+            <a:avLst/>
+          </a:prstGeom>
+          <a:solidFill>
+            <a:srgbClr val="AD3B46"/>
+          </a:solidFill>
+          <a:ln>
+            <a:noFill/>
+          </a:ln>
+        </p:spPr>
+        <p:style>
+          <a:lnRef idx="2">
+            <a:schemeClr val="accent1">
+              <a:shade val="50000"/>
+            </a:schemeClr>
+          </a:lnRef>
+          <a:fillRef idx="1">
+            <a:schemeClr val="accent1"/>
+          </a:fillRef>
+          <a:effectRef idx="0">
+            <a:schemeClr val="accent1"/>
+          </a:effectRef>
+          <a:fontRef idx="minor">
+            <a:schemeClr val="lt1"/>
+          </a:fontRef>
+        </p:style>
+        <p:txBody>
+          <a:bodyPr rtlCol="0" anchor="ctr"/>
+          <a:lstStyle/>
+          <a:p>
+            <a:pPr algn="ctr"/>
+            <a:endParaRPr lang="en-US"/>
+          </a:p>
+        </p:txBody>
+      </p:sp>
+      <p:sp>
+        <p:nvSpPr>
+          <p:cNvPr id="26" name="Rectangle 25">
+            <a:extLst>
+              <a:ext uri="{FF2B5EF4-FFF2-40B4-BE49-F238E27FC236}">
+                <a16:creationId xmlns:a16="http://schemas.microsoft.com/office/drawing/2014/main" id="{0D8FEDAB-4912-4330-AE2E-DD704246BCFA}"/>
+              </a:ext>
+            </a:extLst>
+          </p:cNvPr>
+          <p:cNvSpPr/>
+          <p:nvPr/>
+        </p:nvSpPr>
+        <p:spPr>
+          <a:xfrm>
+            <a:off x="1632725" y="5211290"/>
+            <a:ext cx="579864" cy="549697"/>
+          </a:xfrm>
+          <a:prstGeom prst="rect">
+            <a:avLst/>
+          </a:prstGeom>
+          <a:solidFill>
+            <a:srgbClr val="E2A74E"/>
+          </a:solidFill>
+          <a:ln>
+            <a:noFill/>
+          </a:ln>
+        </p:spPr>
+        <p:style>
+          <a:lnRef idx="2">
+            <a:schemeClr val="accent1">
+              <a:shade val="50000"/>
+            </a:schemeClr>
+          </a:lnRef>
+          <a:fillRef idx="1">
+            <a:schemeClr val="accent1"/>
+          </a:fillRef>
+          <a:effectRef idx="0">
+            <a:schemeClr val="accent1"/>
+          </a:effectRef>
+          <a:fontRef idx="minor">
+            <a:schemeClr val="lt1"/>
+          </a:fontRef>
+        </p:style>
+        <p:txBody>
+          <a:bodyPr rtlCol="0" anchor="ctr"/>
+          <a:lstStyle/>
+          <a:p>
+            <a:pPr algn="ctr"/>
+            <a:endParaRPr lang="en-US"/>
+          </a:p>
+        </p:txBody>
+      </p:sp>
+      <p:sp>
+        <p:nvSpPr>
+          <p:cNvPr id="27" name="Rectangle 26">
+            <a:extLst>
+              <a:ext uri="{FF2B5EF4-FFF2-40B4-BE49-F238E27FC236}">
+                <a16:creationId xmlns:a16="http://schemas.microsoft.com/office/drawing/2014/main" id="{33C22092-C1D7-4058-AC84-7897F51E4B08}"/>
+              </a:ext>
+            </a:extLst>
+          </p:cNvPr>
+          <p:cNvSpPr/>
+          <p:nvPr/>
+        </p:nvSpPr>
+        <p:spPr>
+          <a:xfrm>
+            <a:off x="2663284" y="5211290"/>
+            <a:ext cx="579864" cy="549697"/>
+          </a:xfrm>
+          <a:prstGeom prst="rect">
+            <a:avLst/>
+          </a:prstGeom>
+          <a:solidFill>
+            <a:srgbClr val="33AB40"/>
+          </a:solidFill>
+          <a:ln>
+            <a:noFill/>
+          </a:ln>
+        </p:spPr>
+        <p:style>
+          <a:lnRef idx="2">
+            <a:schemeClr val="accent1">
+              <a:shade val="50000"/>
+            </a:schemeClr>
+          </a:lnRef>
+          <a:fillRef idx="1">
+            <a:schemeClr val="accent1"/>
+          </a:fillRef>
+          <a:effectRef idx="0">
+            <a:schemeClr val="accent1"/>
+          </a:effectRef>
+          <a:fontRef idx="minor">
+            <a:schemeClr val="lt1"/>
+          </a:fontRef>
+        </p:style>
+        <p:txBody>
+          <a:bodyPr rtlCol="0" anchor="ctr"/>
+          <a:lstStyle/>
+          <a:p>
+            <a:pPr algn="ctr"/>
+            <a:endParaRPr lang="en-US" dirty="0"/>
+          </a:p>
+        </p:txBody>
+      </p:sp>
+      <p:sp>
+        <p:nvSpPr>
+          <p:cNvPr id="28" name="Rectangle 27">
+            <a:extLst>
+              <a:ext uri="{FF2B5EF4-FFF2-40B4-BE49-F238E27FC236}">
+                <a16:creationId xmlns:a16="http://schemas.microsoft.com/office/drawing/2014/main" id="{87B84CB9-28BC-4B7A-B402-58B998C86C8D}"/>
+              </a:ext>
+            </a:extLst>
+          </p:cNvPr>
+          <p:cNvSpPr/>
+          <p:nvPr/>
+        </p:nvSpPr>
+        <p:spPr>
+          <a:xfrm>
+            <a:off x="3693843" y="5193050"/>
+            <a:ext cx="579864" cy="549697"/>
+          </a:xfrm>
+          <a:prstGeom prst="rect">
+            <a:avLst/>
+          </a:prstGeom>
+          <a:solidFill>
+            <a:srgbClr val="44A0D4"/>
+          </a:solidFill>
+          <a:ln>
+            <a:noFill/>
+          </a:ln>
+        </p:spPr>
+        <p:style>
+          <a:lnRef idx="2">
+            <a:schemeClr val="accent1">
+              <a:shade val="50000"/>
+            </a:schemeClr>
+          </a:lnRef>
+          <a:fillRef idx="1">
+            <a:schemeClr val="accent1"/>
+          </a:fillRef>
+          <a:effectRef idx="0">
+            <a:schemeClr val="accent1"/>
+          </a:effectRef>
+          <a:fontRef idx="minor">
+            <a:schemeClr val="lt1"/>
+          </a:fontRef>
+        </p:style>
+        <p:txBody>
+          <a:bodyPr rtlCol="0" anchor="ctr"/>
+          <a:lstStyle/>
+          <a:p>
+            <a:pPr algn="ctr"/>
+            <a:endParaRPr lang="en-US"/>
+          </a:p>
+        </p:txBody>
+      </p:sp>
+      <p:grpSp>
+        <p:nvGrpSpPr>
+          <p:cNvPr id="2" name="Group 1">
+            <a:extLst>
+              <a:ext uri="{FF2B5EF4-FFF2-40B4-BE49-F238E27FC236}">
+                <a16:creationId xmlns:a16="http://schemas.microsoft.com/office/drawing/2014/main" id="{049A0524-A259-CC88-C841-2B628F96E6B6}"/>
+              </a:ext>
+            </a:extLst>
+          </p:cNvPr>
+          <p:cNvGrpSpPr/>
+          <p:nvPr/>
+        </p:nvGrpSpPr>
+        <p:grpSpPr>
+          <a:xfrm>
+            <a:off x="4631721" y="1983988"/>
+            <a:ext cx="2928558" cy="2890024"/>
+            <a:chOff x="4631721" y="1983988"/>
+            <a:chExt cx="2928558" cy="2890024"/>
+          </a:xfrm>
+        </p:grpSpPr>
+        <p:sp>
+          <p:nvSpPr>
+            <p:cNvPr id="4" name="Oval 3">
+              <a:extLst>
+                <a:ext uri="{FF2B5EF4-FFF2-40B4-BE49-F238E27FC236}">
+                  <a16:creationId xmlns:a16="http://schemas.microsoft.com/office/drawing/2014/main" id="{BFA83157-7024-45C1-85FC-67F98FA6164D}"/>
+                </a:ext>
+              </a:extLst>
+            </p:cNvPr>
+            <p:cNvSpPr/>
+            <p:nvPr/>
+          </p:nvSpPr>
+          <p:spPr>
+            <a:xfrm rot="2691303">
+              <a:off x="4631721" y="1983988"/>
+              <a:ext cx="2928558" cy="2890024"/>
+            </a:xfrm>
+            <a:prstGeom prst="ellipse">
+              <a:avLst/>
+            </a:prstGeom>
+            <a:solidFill>
+              <a:srgbClr val="161A21"/>
+            </a:solidFill>
+            <a:ln w="57150">
+              <a:solidFill>
+                <a:srgbClr val="161A21"/>
+              </a:solidFill>
+            </a:ln>
+          </p:spPr>
+          <p:style>
+            <a:lnRef idx="2">
+              <a:schemeClr val="accent1">
+                <a:shade val="50000"/>
+              </a:schemeClr>
+            </a:lnRef>
+            <a:fillRef idx="1">
+              <a:schemeClr val="accent1"/>
+            </a:fillRef>
+            <a:effectRef idx="0">
+              <a:schemeClr val="accent1"/>
+            </a:effectRef>
+            <a:fontRef idx="minor">
+              <a:schemeClr val="lt1"/>
+            </a:fontRef>
+          </p:style>
+          <p:txBody>
+            <a:bodyPr rtlCol="0" anchor="ctr"/>
+            <a:lstStyle/>
+            <a:p>
+              <a:pPr algn="ctr"/>
+              <a:endParaRPr lang="en-US"/>
+            </a:p>
+          </p:txBody>
+        </p:sp>
+        <p:sp>
+          <p:nvSpPr>
+            <p:cNvPr id="29" name="Rectangle: Rounded Corners 28">
+              <a:extLst>
+                <a:ext uri="{FF2B5EF4-FFF2-40B4-BE49-F238E27FC236}">
+                  <a16:creationId xmlns:a16="http://schemas.microsoft.com/office/drawing/2014/main" id="{CF5670BB-CF33-EDAE-2F56-098DF1927E42}"/>
+                </a:ext>
+              </a:extLst>
+            </p:cNvPr>
+            <p:cNvSpPr/>
+            <p:nvPr/>
+          </p:nvSpPr>
+          <p:spPr>
+            <a:xfrm rot="2727814">
+              <a:off x="5896016" y="2637481"/>
+              <a:ext cx="365760" cy="1644542"/>
+            </a:xfrm>
+            <a:prstGeom prst="roundRect">
+              <a:avLst>
+                <a:gd name="adj" fmla="val 50000"/>
+              </a:avLst>
+            </a:prstGeom>
+            <a:solidFill>
+              <a:srgbClr val="FFFFFF"/>
+            </a:solidFill>
+            <a:ln>
+              <a:noFill/>
+            </a:ln>
+          </p:spPr>
+          <p:style>
+            <a:lnRef idx="2">
+              <a:schemeClr val="accent1">
+                <a:shade val="50000"/>
+              </a:schemeClr>
+            </a:lnRef>
+            <a:fillRef idx="1">
+              <a:schemeClr val="accent1"/>
+            </a:fillRef>
+            <a:effectRef idx="0">
+              <a:schemeClr val="accent1"/>
+            </a:effectRef>
+            <a:fontRef idx="minor">
+              <a:schemeClr val="lt1"/>
+            </a:fontRef>
+          </p:style>
+          <p:txBody>
+            <a:bodyPr rtlCol="0" anchor="ctr"/>
+            <a:lstStyle/>
+            <a:p>
+              <a:pPr algn="ctr"/>
+              <a:endParaRPr lang="en-US"/>
+            </a:p>
+          </p:txBody>
+        </p:sp>
+        <p:sp>
+          <p:nvSpPr>
+            <p:cNvPr id="30" name="Rectangle: Rounded Corners 29">
+              <a:extLst>
+                <a:ext uri="{FF2B5EF4-FFF2-40B4-BE49-F238E27FC236}">
+                  <a16:creationId xmlns:a16="http://schemas.microsoft.com/office/drawing/2014/main" id="{BE74946D-0DD1-BE7A-A965-6AA99A0701AD}"/>
+                </a:ext>
+              </a:extLst>
+            </p:cNvPr>
+            <p:cNvSpPr/>
+            <p:nvPr/>
+          </p:nvSpPr>
+          <p:spPr>
+            <a:xfrm rot="18868349">
+              <a:off x="5896016" y="2636968"/>
+              <a:ext cx="365760" cy="1644542"/>
+            </a:xfrm>
+            <a:prstGeom prst="roundRect">
+              <a:avLst>
+                <a:gd name="adj" fmla="val 50000"/>
+              </a:avLst>
+            </a:prstGeom>
+            <a:solidFill>
+              <a:srgbClr val="FFFFFF"/>
+            </a:solidFill>
+            <a:ln>
+              <a:noFill/>
+            </a:ln>
+          </p:spPr>
+          <p:style>
+            <a:lnRef idx="2">
+              <a:schemeClr val="accent1">
+                <a:shade val="50000"/>
+              </a:schemeClr>
+            </a:lnRef>
+            <a:fillRef idx="1">
+              <a:schemeClr val="accent1"/>
+            </a:fillRef>
+            <a:effectRef idx="0">
+              <a:schemeClr val="accent1"/>
+            </a:effectRef>
+            <a:fontRef idx="minor">
+              <a:schemeClr val="lt1"/>
+            </a:fontRef>
+          </p:style>
+          <p:txBody>
+            <a:bodyPr rtlCol="0" anchor="ctr"/>
+            <a:lstStyle/>
+            <a:p>
+              <a:pPr algn="ctr"/>
+              <a:endParaRPr lang="en-US"/>
+            </a:p>
+          </p:txBody>
+        </p:sp>
+      </p:grpSp>
+    </p:spTree>
+    <p:extLst>
+      <p:ext uri="{BB962C8B-B14F-4D97-AF65-F5344CB8AC3E}">
+        <p14:creationId xmlns:p14="http://schemas.microsoft.com/office/powerpoint/2010/main" val="2949897859"/>
+      </p:ext>
+    </p:extLst>
+  </p:cSld>
+  <p:clrMapOvr>
+    <a:masterClrMapping/>
+  </p:clrMapOvr>
+</p:sld>
+</file>
+
+<file path=ppt/slides/slide15.xml><?xml version="1.0" encoding="utf-8"?>
+<p:sld xmlns:a="http://schemas.openxmlformats.org/drawingml/2006/main" xmlns:r="http://schemas.openxmlformats.org/officeDocument/2006/relationships" xmlns:p="http://schemas.openxmlformats.org/presentationml/2006/main">
+  <p:cSld>
+    <p:spTree>
+      <p:nvGrpSpPr>
+        <p:cNvPr id="1" name=""/>
+        <p:cNvGrpSpPr/>
+        <p:nvPr/>
+      </p:nvGrpSpPr>
+      <p:grpSpPr>
+        <a:xfrm>
+          <a:off x="0" y="0"/>
+          <a:ext cx="0" cy="0"/>
+          <a:chOff x="0" y="0"/>
+          <a:chExt cx="0" cy="0"/>
+        </a:xfrm>
+      </p:grpSpPr>
+      <p:sp>
+        <p:nvSpPr>
+          <p:cNvPr id="5" name="Rectangle 4">
+            <a:extLst>
+              <a:ext uri="{FF2B5EF4-FFF2-40B4-BE49-F238E27FC236}">
+                <a16:creationId xmlns:a16="http://schemas.microsoft.com/office/drawing/2014/main" id="{F061ACAB-424F-4501-97F7-30C21D0EA7A1}"/>
+              </a:ext>
+            </a:extLst>
+          </p:cNvPr>
+          <p:cNvSpPr/>
+          <p:nvPr/>
+        </p:nvSpPr>
+        <p:spPr>
+          <a:xfrm>
+            <a:off x="602166" y="5999356"/>
+            <a:ext cx="579864" cy="549697"/>
+          </a:xfrm>
+          <a:prstGeom prst="rect">
+            <a:avLst/>
+          </a:prstGeom>
+          <a:solidFill>
+            <a:srgbClr val="F96160"/>
+          </a:solidFill>
+          <a:ln>
+            <a:noFill/>
+          </a:ln>
+        </p:spPr>
+        <p:style>
+          <a:lnRef idx="2">
+            <a:schemeClr val="accent1">
+              <a:shade val="50000"/>
+            </a:schemeClr>
+          </a:lnRef>
+          <a:fillRef idx="1">
+            <a:schemeClr val="accent1"/>
+          </a:fillRef>
+          <a:effectRef idx="0">
+            <a:schemeClr val="accent1"/>
+          </a:effectRef>
+          <a:fontRef idx="minor">
+            <a:schemeClr val="lt1"/>
+          </a:fontRef>
+        </p:style>
+        <p:txBody>
+          <a:bodyPr rtlCol="0" anchor="ctr"/>
+          <a:lstStyle/>
+          <a:p>
+            <a:pPr algn="ctr"/>
+            <a:endParaRPr lang="en-US"/>
+          </a:p>
+        </p:txBody>
+      </p:sp>
+      <p:sp>
+        <p:nvSpPr>
+          <p:cNvPr id="7" name="Rectangle 6">
+            <a:extLst>
+              <a:ext uri="{FF2B5EF4-FFF2-40B4-BE49-F238E27FC236}">
+                <a16:creationId xmlns:a16="http://schemas.microsoft.com/office/drawing/2014/main" id="{CCB2303E-C712-4CC7-A07E-30C89AA6C536}"/>
+              </a:ext>
+            </a:extLst>
+          </p:cNvPr>
+          <p:cNvSpPr/>
+          <p:nvPr/>
+        </p:nvSpPr>
+        <p:spPr>
+          <a:xfrm>
+            <a:off x="1632725" y="5999355"/>
+            <a:ext cx="579864" cy="549697"/>
+          </a:xfrm>
+          <a:prstGeom prst="rect">
+            <a:avLst/>
+          </a:prstGeom>
+          <a:solidFill>
+            <a:srgbClr val="FBBB4D"/>
+          </a:solidFill>
+          <a:ln>
+            <a:noFill/>
+          </a:ln>
+        </p:spPr>
+        <p:style>
+          <a:lnRef idx="2">
+            <a:schemeClr val="accent1">
+              <a:shade val="50000"/>
+            </a:schemeClr>
+          </a:lnRef>
+          <a:fillRef idx="1">
+            <a:schemeClr val="accent1"/>
+          </a:fillRef>
+          <a:effectRef idx="0">
+            <a:schemeClr val="accent1"/>
+          </a:effectRef>
+          <a:fontRef idx="minor">
+            <a:schemeClr val="lt1"/>
+          </a:fontRef>
+        </p:style>
+        <p:txBody>
+          <a:bodyPr rtlCol="0" anchor="ctr"/>
+          <a:lstStyle/>
+          <a:p>
+            <a:pPr algn="ctr"/>
+            <a:endParaRPr lang="en-US"/>
+          </a:p>
+        </p:txBody>
+      </p:sp>
+      <p:sp>
+        <p:nvSpPr>
+          <p:cNvPr id="8" name="Rectangle 7">
+            <a:extLst>
+              <a:ext uri="{FF2B5EF4-FFF2-40B4-BE49-F238E27FC236}">
+                <a16:creationId xmlns:a16="http://schemas.microsoft.com/office/drawing/2014/main" id="{5D372310-AF1C-41DC-90C3-5A0D1E14266A}"/>
+              </a:ext>
+            </a:extLst>
+          </p:cNvPr>
+          <p:cNvSpPr/>
+          <p:nvPr/>
+        </p:nvSpPr>
+        <p:spPr>
+          <a:xfrm>
+            <a:off x="2663284" y="5999355"/>
+            <a:ext cx="579864" cy="549697"/>
+          </a:xfrm>
+          <a:prstGeom prst="rect">
+            <a:avLst/>
+          </a:prstGeom>
+          <a:solidFill>
+            <a:srgbClr val="3EC451"/>
+          </a:solidFill>
+          <a:ln>
+            <a:noFill/>
+          </a:ln>
+        </p:spPr>
+        <p:style>
+          <a:lnRef idx="2">
+            <a:schemeClr val="accent1">
+              <a:shade val="50000"/>
+            </a:schemeClr>
+          </a:lnRef>
+          <a:fillRef idx="1">
+            <a:schemeClr val="accent1"/>
+          </a:fillRef>
+          <a:effectRef idx="0">
+            <a:schemeClr val="accent1"/>
+          </a:effectRef>
+          <a:fontRef idx="minor">
+            <a:schemeClr val="lt1"/>
+          </a:fontRef>
+        </p:style>
+        <p:txBody>
+          <a:bodyPr rtlCol="0" anchor="ctr"/>
+          <a:lstStyle/>
+          <a:p>
+            <a:pPr algn="ctr"/>
+            <a:endParaRPr lang="en-US" dirty="0"/>
+          </a:p>
+        </p:txBody>
+      </p:sp>
+      <p:sp>
+        <p:nvSpPr>
+          <p:cNvPr id="9" name="Rectangle 8">
+            <a:extLst>
+              <a:ext uri="{FF2B5EF4-FFF2-40B4-BE49-F238E27FC236}">
+                <a16:creationId xmlns:a16="http://schemas.microsoft.com/office/drawing/2014/main" id="{C59D9ACE-0F71-4801-AEA0-AA357C2034E7}"/>
+              </a:ext>
+            </a:extLst>
+          </p:cNvPr>
+          <p:cNvSpPr/>
+          <p:nvPr/>
+        </p:nvSpPr>
+        <p:spPr>
+          <a:xfrm>
+            <a:off x="3693843" y="5999355"/>
+            <a:ext cx="579864" cy="549697"/>
+          </a:xfrm>
+          <a:prstGeom prst="rect">
+            <a:avLst/>
+          </a:prstGeom>
+          <a:solidFill>
+            <a:srgbClr val="4BB8F3"/>
+          </a:solidFill>
+          <a:ln>
+            <a:noFill/>
+          </a:ln>
+        </p:spPr>
+        <p:style>
+          <a:lnRef idx="2">
+            <a:schemeClr val="accent1">
+              <a:shade val="50000"/>
+            </a:schemeClr>
+          </a:lnRef>
+          <a:fillRef idx="1">
+            <a:schemeClr val="accent1"/>
+          </a:fillRef>
+          <a:effectRef idx="0">
+            <a:schemeClr val="accent1"/>
+          </a:effectRef>
+          <a:fontRef idx="minor">
+            <a:schemeClr val="lt1"/>
+          </a:fontRef>
+        </p:style>
+        <p:txBody>
+          <a:bodyPr rtlCol="0" anchor="ctr"/>
+          <a:lstStyle/>
+          <a:p>
+            <a:pPr algn="ctr"/>
+            <a:endParaRPr lang="en-US"/>
+          </a:p>
+        </p:txBody>
+      </p:sp>
+      <p:sp>
+        <p:nvSpPr>
+          <p:cNvPr id="13" name="Rectangle 12">
+            <a:extLst>
+              <a:ext uri="{FF2B5EF4-FFF2-40B4-BE49-F238E27FC236}">
+                <a16:creationId xmlns:a16="http://schemas.microsoft.com/office/drawing/2014/main" id="{A4AF4B1F-0B61-4962-B93C-3A917575583C}"/>
+              </a:ext>
+            </a:extLst>
+          </p:cNvPr>
+          <p:cNvSpPr/>
+          <p:nvPr/>
+        </p:nvSpPr>
+        <p:spPr>
+          <a:xfrm>
+            <a:off x="4724402" y="5999355"/>
+            <a:ext cx="579864" cy="549697"/>
+          </a:xfrm>
+          <a:prstGeom prst="rect">
+            <a:avLst/>
+          </a:prstGeom>
+          <a:solidFill>
+            <a:srgbClr val="353535"/>
+          </a:solidFill>
+          <a:ln>
+            <a:noFill/>
+          </a:ln>
+        </p:spPr>
+        <p:style>
+          <a:lnRef idx="2">
+            <a:schemeClr val="accent1">
+              <a:shade val="50000"/>
+            </a:schemeClr>
+          </a:lnRef>
+          <a:fillRef idx="1">
+            <a:schemeClr val="accent1"/>
+          </a:fillRef>
+          <a:effectRef idx="0">
+            <a:schemeClr val="accent1"/>
+          </a:effectRef>
+          <a:fontRef idx="minor">
+            <a:schemeClr val="lt1"/>
+          </a:fontRef>
+        </p:style>
+        <p:txBody>
+          <a:bodyPr rtlCol="0" anchor="ctr"/>
+          <a:lstStyle/>
+          <a:p>
+            <a:pPr algn="ctr"/>
+            <a:endParaRPr lang="en-US"/>
+          </a:p>
+        </p:txBody>
+      </p:sp>
+      <p:sp>
+        <p:nvSpPr>
+          <p:cNvPr id="21" name="Rectangle 20">
+            <a:extLst>
+              <a:ext uri="{FF2B5EF4-FFF2-40B4-BE49-F238E27FC236}">
+                <a16:creationId xmlns:a16="http://schemas.microsoft.com/office/drawing/2014/main" id="{C9527B53-C5C5-409E-9633-74903E8F3DAA}"/>
+              </a:ext>
+            </a:extLst>
+          </p:cNvPr>
+          <p:cNvSpPr/>
+          <p:nvPr/>
+        </p:nvSpPr>
+        <p:spPr>
+          <a:xfrm>
+            <a:off x="602166" y="5999356"/>
+            <a:ext cx="579864" cy="549697"/>
+          </a:xfrm>
+          <a:prstGeom prst="rect">
+            <a:avLst/>
+          </a:prstGeom>
+          <a:solidFill>
+            <a:srgbClr val="F96160"/>
+          </a:solidFill>
+          <a:ln>
+            <a:noFill/>
+          </a:ln>
+        </p:spPr>
+        <p:style>
+          <a:lnRef idx="2">
+            <a:schemeClr val="accent1">
+              <a:shade val="50000"/>
+            </a:schemeClr>
+          </a:lnRef>
+          <a:fillRef idx="1">
+            <a:schemeClr val="accent1"/>
+          </a:fillRef>
+          <a:effectRef idx="0">
+            <a:schemeClr val="accent1"/>
+          </a:effectRef>
+          <a:fontRef idx="minor">
+            <a:schemeClr val="lt1"/>
+          </a:fontRef>
+        </p:style>
+        <p:txBody>
+          <a:bodyPr rtlCol="0" anchor="ctr"/>
+          <a:lstStyle/>
+          <a:p>
+            <a:pPr algn="ctr"/>
+            <a:endParaRPr lang="en-US"/>
+          </a:p>
+        </p:txBody>
+      </p:sp>
+      <p:sp>
+        <p:nvSpPr>
+          <p:cNvPr id="22" name="Rectangle 21">
+            <a:extLst>
+              <a:ext uri="{FF2B5EF4-FFF2-40B4-BE49-F238E27FC236}">
+                <a16:creationId xmlns:a16="http://schemas.microsoft.com/office/drawing/2014/main" id="{79845A40-9D1A-4ACA-A962-10F5951E4C90}"/>
+              </a:ext>
+            </a:extLst>
+          </p:cNvPr>
+          <p:cNvSpPr/>
+          <p:nvPr/>
+        </p:nvSpPr>
+        <p:spPr>
+          <a:xfrm>
+            <a:off x="1632725" y="5999355"/>
+            <a:ext cx="579864" cy="549697"/>
+          </a:xfrm>
+          <a:prstGeom prst="rect">
+            <a:avLst/>
+          </a:prstGeom>
+          <a:solidFill>
+            <a:srgbClr val="FBBB4D"/>
+          </a:solidFill>
+          <a:ln>
+            <a:noFill/>
+          </a:ln>
+        </p:spPr>
+        <p:style>
+          <a:lnRef idx="2">
+            <a:schemeClr val="accent1">
+              <a:shade val="50000"/>
+            </a:schemeClr>
+          </a:lnRef>
+          <a:fillRef idx="1">
+            <a:schemeClr val="accent1"/>
+          </a:fillRef>
+          <a:effectRef idx="0">
+            <a:schemeClr val="accent1"/>
+          </a:effectRef>
+          <a:fontRef idx="minor">
+            <a:schemeClr val="lt1"/>
+          </a:fontRef>
+        </p:style>
+        <p:txBody>
+          <a:bodyPr rtlCol="0" anchor="ctr"/>
+          <a:lstStyle/>
+          <a:p>
+            <a:pPr algn="ctr"/>
+            <a:endParaRPr lang="en-US"/>
+          </a:p>
+        </p:txBody>
+      </p:sp>
+      <p:sp>
+        <p:nvSpPr>
+          <p:cNvPr id="23" name="Rectangle 22">
+            <a:extLst>
+              <a:ext uri="{FF2B5EF4-FFF2-40B4-BE49-F238E27FC236}">
+                <a16:creationId xmlns:a16="http://schemas.microsoft.com/office/drawing/2014/main" id="{AE59CE73-14E3-4608-A356-D2119519506E}"/>
+              </a:ext>
+            </a:extLst>
+          </p:cNvPr>
+          <p:cNvSpPr/>
+          <p:nvPr/>
+        </p:nvSpPr>
+        <p:spPr>
+          <a:xfrm>
+            <a:off x="2663284" y="5999355"/>
+            <a:ext cx="579864" cy="549697"/>
+          </a:xfrm>
+          <a:prstGeom prst="rect">
+            <a:avLst/>
+          </a:prstGeom>
+          <a:solidFill>
+            <a:srgbClr val="3EC451"/>
+          </a:solidFill>
+          <a:ln>
+            <a:noFill/>
+          </a:ln>
+        </p:spPr>
+        <p:style>
+          <a:lnRef idx="2">
+            <a:schemeClr val="accent1">
+              <a:shade val="50000"/>
+            </a:schemeClr>
+          </a:lnRef>
+          <a:fillRef idx="1">
+            <a:schemeClr val="accent1"/>
+          </a:fillRef>
+          <a:effectRef idx="0">
+            <a:schemeClr val="accent1"/>
+          </a:effectRef>
+          <a:fontRef idx="minor">
+            <a:schemeClr val="lt1"/>
+          </a:fontRef>
+        </p:style>
+        <p:txBody>
+          <a:bodyPr rtlCol="0" anchor="ctr"/>
+          <a:lstStyle/>
+          <a:p>
+            <a:pPr algn="ctr"/>
+            <a:endParaRPr lang="en-US" dirty="0"/>
+          </a:p>
+        </p:txBody>
+      </p:sp>
+      <p:sp>
+        <p:nvSpPr>
+          <p:cNvPr id="24" name="Rectangle 23">
+            <a:extLst>
+              <a:ext uri="{FF2B5EF4-FFF2-40B4-BE49-F238E27FC236}">
+                <a16:creationId xmlns:a16="http://schemas.microsoft.com/office/drawing/2014/main" id="{C079055C-121E-4026-A811-3915394804C6}"/>
+              </a:ext>
+            </a:extLst>
+          </p:cNvPr>
+          <p:cNvSpPr/>
+          <p:nvPr/>
+        </p:nvSpPr>
+        <p:spPr>
+          <a:xfrm>
+            <a:off x="3693843" y="5999355"/>
+            <a:ext cx="579864" cy="549697"/>
+          </a:xfrm>
+          <a:prstGeom prst="rect">
+            <a:avLst/>
+          </a:prstGeom>
+          <a:solidFill>
+            <a:srgbClr val="4BB8F3"/>
+          </a:solidFill>
+          <a:ln>
+            <a:noFill/>
+          </a:ln>
+        </p:spPr>
+        <p:style>
+          <a:lnRef idx="2">
+            <a:schemeClr val="accent1">
+              <a:shade val="50000"/>
+            </a:schemeClr>
+          </a:lnRef>
+          <a:fillRef idx="1">
+            <a:schemeClr val="accent1"/>
+          </a:fillRef>
+          <a:effectRef idx="0">
+            <a:schemeClr val="accent1"/>
+          </a:effectRef>
+          <a:fontRef idx="minor">
+            <a:schemeClr val="lt1"/>
+          </a:fontRef>
+        </p:style>
+        <p:txBody>
+          <a:bodyPr rtlCol="0" anchor="ctr"/>
+          <a:lstStyle/>
+          <a:p>
+            <a:pPr algn="ctr"/>
+            <a:endParaRPr lang="en-US"/>
+          </a:p>
+        </p:txBody>
+      </p:sp>
+      <p:sp>
+        <p:nvSpPr>
+          <p:cNvPr id="25" name="Rectangle 24">
+            <a:extLst>
+              <a:ext uri="{FF2B5EF4-FFF2-40B4-BE49-F238E27FC236}">
+                <a16:creationId xmlns:a16="http://schemas.microsoft.com/office/drawing/2014/main" id="{45614592-593B-4CFE-8347-B5BE830FF4F9}"/>
+              </a:ext>
+            </a:extLst>
+          </p:cNvPr>
+          <p:cNvSpPr/>
+          <p:nvPr/>
+        </p:nvSpPr>
+        <p:spPr>
+          <a:xfrm>
+            <a:off x="602166" y="5211290"/>
+            <a:ext cx="579864" cy="549697"/>
+          </a:xfrm>
+          <a:prstGeom prst="rect">
+            <a:avLst/>
+          </a:prstGeom>
+          <a:solidFill>
+            <a:srgbClr val="F96160"/>
+          </a:solidFill>
+          <a:ln>
+            <a:noFill/>
+          </a:ln>
+        </p:spPr>
+        <p:style>
+          <a:lnRef idx="2">
+            <a:schemeClr val="accent1">
+              <a:shade val="50000"/>
+            </a:schemeClr>
+          </a:lnRef>
+          <a:fillRef idx="1">
+            <a:schemeClr val="accent1"/>
+          </a:fillRef>
+          <a:effectRef idx="0">
+            <a:schemeClr val="accent1"/>
+          </a:effectRef>
+          <a:fontRef idx="minor">
+            <a:schemeClr val="lt1"/>
+          </a:fontRef>
+        </p:style>
+        <p:txBody>
+          <a:bodyPr rtlCol="0" anchor="ctr"/>
+          <a:lstStyle/>
+          <a:p>
+            <a:pPr algn="ctr"/>
+            <a:endParaRPr lang="en-US"/>
+          </a:p>
+        </p:txBody>
+      </p:sp>
+      <p:sp>
+        <p:nvSpPr>
+          <p:cNvPr id="26" name="Rectangle 25">
+            <a:extLst>
+              <a:ext uri="{FF2B5EF4-FFF2-40B4-BE49-F238E27FC236}">
+                <a16:creationId xmlns:a16="http://schemas.microsoft.com/office/drawing/2014/main" id="{0D8FEDAB-4912-4330-AE2E-DD704246BCFA}"/>
+              </a:ext>
+            </a:extLst>
+          </p:cNvPr>
+          <p:cNvSpPr/>
+          <p:nvPr/>
+        </p:nvSpPr>
+        <p:spPr>
+          <a:xfrm>
+            <a:off x="1632725" y="5211290"/>
+            <a:ext cx="579864" cy="549697"/>
+          </a:xfrm>
+          <a:prstGeom prst="rect">
+            <a:avLst/>
+          </a:prstGeom>
+          <a:solidFill>
+            <a:srgbClr val="E2A74E"/>
+          </a:solidFill>
+          <a:ln>
+            <a:noFill/>
+          </a:ln>
+        </p:spPr>
+        <p:style>
+          <a:lnRef idx="2">
+            <a:schemeClr val="accent1">
+              <a:shade val="50000"/>
+            </a:schemeClr>
+          </a:lnRef>
+          <a:fillRef idx="1">
+            <a:schemeClr val="accent1"/>
+          </a:fillRef>
+          <a:effectRef idx="0">
+            <a:schemeClr val="accent1"/>
+          </a:effectRef>
+          <a:fontRef idx="minor">
+            <a:schemeClr val="lt1"/>
+          </a:fontRef>
+        </p:style>
+        <p:txBody>
+          <a:bodyPr rtlCol="0" anchor="ctr"/>
+          <a:lstStyle/>
+          <a:p>
+            <a:pPr algn="ctr"/>
+            <a:endParaRPr lang="en-US"/>
+          </a:p>
+        </p:txBody>
+      </p:sp>
+      <p:sp>
+        <p:nvSpPr>
+          <p:cNvPr id="27" name="Rectangle 26">
+            <a:extLst>
+              <a:ext uri="{FF2B5EF4-FFF2-40B4-BE49-F238E27FC236}">
+                <a16:creationId xmlns:a16="http://schemas.microsoft.com/office/drawing/2014/main" id="{33C22092-C1D7-4058-AC84-7897F51E4B08}"/>
+              </a:ext>
+            </a:extLst>
+          </p:cNvPr>
+          <p:cNvSpPr/>
+          <p:nvPr/>
+        </p:nvSpPr>
+        <p:spPr>
+          <a:xfrm>
+            <a:off x="2663284" y="5211290"/>
+            <a:ext cx="579864" cy="549697"/>
+          </a:xfrm>
+          <a:prstGeom prst="rect">
+            <a:avLst/>
+          </a:prstGeom>
+          <a:solidFill>
+            <a:srgbClr val="33AB40"/>
+          </a:solidFill>
+          <a:ln>
+            <a:noFill/>
+          </a:ln>
+        </p:spPr>
+        <p:style>
+          <a:lnRef idx="2">
+            <a:schemeClr val="accent1">
+              <a:shade val="50000"/>
+            </a:schemeClr>
+          </a:lnRef>
+          <a:fillRef idx="1">
+            <a:schemeClr val="accent1"/>
+          </a:fillRef>
+          <a:effectRef idx="0">
+            <a:schemeClr val="accent1"/>
+          </a:effectRef>
+          <a:fontRef idx="minor">
+            <a:schemeClr val="lt1"/>
+          </a:fontRef>
+        </p:style>
+        <p:txBody>
+          <a:bodyPr rtlCol="0" anchor="ctr"/>
+          <a:lstStyle/>
+          <a:p>
+            <a:pPr algn="ctr"/>
+            <a:endParaRPr lang="en-US" dirty="0"/>
+          </a:p>
+        </p:txBody>
+      </p:sp>
+      <p:sp>
+        <p:nvSpPr>
+          <p:cNvPr id="28" name="Rectangle 27">
+            <a:extLst>
+              <a:ext uri="{FF2B5EF4-FFF2-40B4-BE49-F238E27FC236}">
+                <a16:creationId xmlns:a16="http://schemas.microsoft.com/office/drawing/2014/main" id="{87B84CB9-28BC-4B7A-B402-58B998C86C8D}"/>
+              </a:ext>
+            </a:extLst>
+          </p:cNvPr>
+          <p:cNvSpPr/>
+          <p:nvPr/>
+        </p:nvSpPr>
+        <p:spPr>
+          <a:xfrm>
+            <a:off x="3693843" y="5193050"/>
+            <a:ext cx="579864" cy="549697"/>
+          </a:xfrm>
+          <a:prstGeom prst="rect">
+            <a:avLst/>
+          </a:prstGeom>
+          <a:solidFill>
+            <a:srgbClr val="44A0D4"/>
+          </a:solidFill>
+          <a:ln>
+            <a:noFill/>
+          </a:ln>
+        </p:spPr>
+        <p:style>
+          <a:lnRef idx="2">
+            <a:schemeClr val="accent1">
+              <a:shade val="50000"/>
+            </a:schemeClr>
+          </a:lnRef>
+          <a:fillRef idx="1">
+            <a:schemeClr val="accent1"/>
+          </a:fillRef>
+          <a:effectRef idx="0">
+            <a:schemeClr val="accent1"/>
+          </a:effectRef>
+          <a:fontRef idx="minor">
+            <a:schemeClr val="lt1"/>
+          </a:fontRef>
+        </p:style>
+        <p:txBody>
+          <a:bodyPr rtlCol="0" anchor="ctr"/>
+          <a:lstStyle/>
+          <a:p>
+            <a:pPr algn="ctr"/>
+            <a:endParaRPr lang="en-US"/>
+          </a:p>
+        </p:txBody>
+      </p:sp>
+      <p:grpSp>
+        <p:nvGrpSpPr>
+          <p:cNvPr id="2" name="Group 1">
+            <a:extLst>
+              <a:ext uri="{FF2B5EF4-FFF2-40B4-BE49-F238E27FC236}">
+                <a16:creationId xmlns:a16="http://schemas.microsoft.com/office/drawing/2014/main" id="{35A0FB96-5E75-8033-D40D-3C188F3F765A}"/>
+              </a:ext>
+            </a:extLst>
+          </p:cNvPr>
+          <p:cNvGrpSpPr/>
+          <p:nvPr/>
+        </p:nvGrpSpPr>
+        <p:grpSpPr>
+          <a:xfrm>
+            <a:off x="4631721" y="1983988"/>
+            <a:ext cx="2928558" cy="2890024"/>
+            <a:chOff x="4631721" y="1983988"/>
+            <a:chExt cx="2928558" cy="2890024"/>
+          </a:xfrm>
+        </p:grpSpPr>
+        <p:sp>
+          <p:nvSpPr>
+            <p:cNvPr id="4" name="Oval 3">
+              <a:extLst>
+                <a:ext uri="{FF2B5EF4-FFF2-40B4-BE49-F238E27FC236}">
+                  <a16:creationId xmlns:a16="http://schemas.microsoft.com/office/drawing/2014/main" id="{BFA83157-7024-45C1-85FC-67F98FA6164D}"/>
+                </a:ext>
+              </a:extLst>
+            </p:cNvPr>
+            <p:cNvSpPr/>
+            <p:nvPr/>
+          </p:nvSpPr>
+          <p:spPr>
+            <a:xfrm rot="2691303">
+              <a:off x="4631721" y="1983988"/>
+              <a:ext cx="2928558" cy="2890024"/>
+            </a:xfrm>
+            <a:prstGeom prst="ellipse">
+              <a:avLst/>
+            </a:prstGeom>
+            <a:solidFill>
+              <a:srgbClr val="F96160"/>
+            </a:solidFill>
+            <a:ln w="57150">
+              <a:solidFill>
+                <a:srgbClr val="E34F4C"/>
+              </a:solidFill>
+            </a:ln>
+          </p:spPr>
+          <p:style>
+            <a:lnRef idx="2">
+              <a:schemeClr val="accent1">
+                <a:shade val="50000"/>
+              </a:schemeClr>
+            </a:lnRef>
+            <a:fillRef idx="1">
+              <a:schemeClr val="accent1"/>
+            </a:fillRef>
+            <a:effectRef idx="0">
+              <a:schemeClr val="accent1"/>
+            </a:effectRef>
+            <a:fontRef idx="minor">
+              <a:schemeClr val="lt1"/>
+            </a:fontRef>
+          </p:style>
+          <p:txBody>
+            <a:bodyPr rtlCol="0" anchor="ctr"/>
+            <a:lstStyle/>
+            <a:p>
+              <a:pPr algn="ctr"/>
+              <a:endParaRPr lang="en-US"/>
+            </a:p>
+          </p:txBody>
+        </p:sp>
+        <p:sp>
+          <p:nvSpPr>
+            <p:cNvPr id="29" name="Rectangle: Rounded Corners 28">
+              <a:extLst>
+                <a:ext uri="{FF2B5EF4-FFF2-40B4-BE49-F238E27FC236}">
+                  <a16:creationId xmlns:a16="http://schemas.microsoft.com/office/drawing/2014/main" id="{CF5670BB-CF33-EDAE-2F56-098DF1927E42}"/>
+                </a:ext>
+              </a:extLst>
+            </p:cNvPr>
+            <p:cNvSpPr/>
+            <p:nvPr/>
+          </p:nvSpPr>
+          <p:spPr>
+            <a:xfrm rot="2727814">
+              <a:off x="5896016" y="2637481"/>
+              <a:ext cx="365760" cy="1644542"/>
+            </a:xfrm>
+            <a:prstGeom prst="roundRect">
+              <a:avLst>
+                <a:gd name="adj" fmla="val 50000"/>
+              </a:avLst>
+            </a:prstGeom>
+            <a:solidFill>
+              <a:srgbClr val="1C2028"/>
+            </a:solidFill>
+            <a:ln>
+              <a:solidFill>
+                <a:srgbClr val="1C2028"/>
+              </a:solidFill>
+            </a:ln>
+          </p:spPr>
+          <p:style>
+            <a:lnRef idx="2">
+              <a:schemeClr val="accent1">
+                <a:shade val="50000"/>
+              </a:schemeClr>
+            </a:lnRef>
+            <a:fillRef idx="1">
+              <a:schemeClr val="accent1"/>
+            </a:fillRef>
+            <a:effectRef idx="0">
+              <a:schemeClr val="accent1"/>
+            </a:effectRef>
+            <a:fontRef idx="minor">
+              <a:schemeClr val="lt1"/>
+            </a:fontRef>
+          </p:style>
+          <p:txBody>
+            <a:bodyPr rtlCol="0" anchor="ctr"/>
+            <a:lstStyle/>
+            <a:p>
+              <a:pPr algn="ctr"/>
+              <a:endParaRPr lang="en-US"/>
+            </a:p>
+          </p:txBody>
+        </p:sp>
+        <p:sp>
+          <p:nvSpPr>
+            <p:cNvPr id="30" name="Rectangle: Rounded Corners 29">
+              <a:extLst>
+                <a:ext uri="{FF2B5EF4-FFF2-40B4-BE49-F238E27FC236}">
+                  <a16:creationId xmlns:a16="http://schemas.microsoft.com/office/drawing/2014/main" id="{BE74946D-0DD1-BE7A-A965-6AA99A0701AD}"/>
+                </a:ext>
+              </a:extLst>
+            </p:cNvPr>
+            <p:cNvSpPr/>
+            <p:nvPr/>
+          </p:nvSpPr>
+          <p:spPr>
+            <a:xfrm rot="18868349">
+              <a:off x="5896016" y="2636968"/>
+              <a:ext cx="365760" cy="1644542"/>
+            </a:xfrm>
+            <a:prstGeom prst="roundRect">
+              <a:avLst>
+                <a:gd name="adj" fmla="val 50000"/>
+              </a:avLst>
+            </a:prstGeom>
+            <a:solidFill>
+              <a:srgbClr val="1C2028"/>
+            </a:solidFill>
+            <a:ln>
+              <a:solidFill>
+                <a:srgbClr val="1C2028"/>
+              </a:solidFill>
+            </a:ln>
+          </p:spPr>
+          <p:style>
+            <a:lnRef idx="2">
+              <a:schemeClr val="accent1">
+                <a:shade val="50000"/>
+              </a:schemeClr>
+            </a:lnRef>
+            <a:fillRef idx="1">
+              <a:schemeClr val="accent1"/>
+            </a:fillRef>
+            <a:effectRef idx="0">
+              <a:schemeClr val="accent1"/>
+            </a:effectRef>
+            <a:fontRef idx="minor">
+              <a:schemeClr val="lt1"/>
+            </a:fontRef>
+          </p:style>
+          <p:txBody>
+            <a:bodyPr rtlCol="0" anchor="ctr"/>
+            <a:lstStyle/>
+            <a:p>
+              <a:pPr algn="ctr"/>
+              <a:endParaRPr lang="en-US"/>
+            </a:p>
+          </p:txBody>
+        </p:sp>
+      </p:grpSp>
+    </p:spTree>
+    <p:extLst>
+      <p:ext uri="{BB962C8B-B14F-4D97-AF65-F5344CB8AC3E}">
+        <p14:creationId xmlns:p14="http://schemas.microsoft.com/office/powerpoint/2010/main" val="1319697331"/>
+      </p:ext>
+    </p:extLst>
+  </p:cSld>
+  <p:clrMapOvr>
+    <a:masterClrMapping/>
+  </p:clrMapOvr>
+</p:sld>
+</file>
+
+<file path=ppt/slides/slide16.xml><?xml version="1.0" encoding="utf-8"?>
+<p:sld xmlns:a="http://schemas.openxmlformats.org/drawingml/2006/main" xmlns:r="http://schemas.openxmlformats.org/officeDocument/2006/relationships" xmlns:p="http://schemas.openxmlformats.org/presentationml/2006/main">
+  <p:cSld>
+    <p:spTree>
+      <p:nvGrpSpPr>
+        <p:cNvPr id="1" name=""/>
+        <p:cNvGrpSpPr/>
+        <p:nvPr/>
+      </p:nvGrpSpPr>
+      <p:grpSpPr>
+        <a:xfrm>
+          <a:off x="0" y="0"/>
+          <a:ext cx="0" cy="0"/>
+          <a:chOff x="0" y="0"/>
+          <a:chExt cx="0" cy="0"/>
+        </a:xfrm>
+      </p:grpSpPr>
+      <p:sp>
+        <p:nvSpPr>
+          <p:cNvPr id="5" name="Rectangle 4">
+            <a:extLst>
+              <a:ext uri="{FF2B5EF4-FFF2-40B4-BE49-F238E27FC236}">
+                <a16:creationId xmlns:a16="http://schemas.microsoft.com/office/drawing/2014/main" id="{F061ACAB-424F-4501-97F7-30C21D0EA7A1}"/>
+              </a:ext>
+            </a:extLst>
+          </p:cNvPr>
+          <p:cNvSpPr/>
+          <p:nvPr/>
+        </p:nvSpPr>
+        <p:spPr>
+          <a:xfrm>
+            <a:off x="602166" y="5999356"/>
+            <a:ext cx="579864" cy="549697"/>
+          </a:xfrm>
+          <a:prstGeom prst="rect">
+            <a:avLst/>
+          </a:prstGeom>
+          <a:solidFill>
+            <a:srgbClr val="F96160"/>
+          </a:solidFill>
+          <a:ln>
+            <a:noFill/>
+          </a:ln>
+        </p:spPr>
+        <p:style>
+          <a:lnRef idx="2">
+            <a:schemeClr val="accent1">
+              <a:shade val="50000"/>
+            </a:schemeClr>
+          </a:lnRef>
+          <a:fillRef idx="1">
+            <a:schemeClr val="accent1"/>
+          </a:fillRef>
+          <a:effectRef idx="0">
+            <a:schemeClr val="accent1"/>
+          </a:effectRef>
+          <a:fontRef idx="minor">
+            <a:schemeClr val="lt1"/>
+          </a:fontRef>
+        </p:style>
+        <p:txBody>
+          <a:bodyPr rtlCol="0" anchor="ctr"/>
+          <a:lstStyle/>
+          <a:p>
+            <a:pPr algn="ctr"/>
+            <a:endParaRPr lang="en-US"/>
+          </a:p>
+        </p:txBody>
+      </p:sp>
+      <p:sp>
+        <p:nvSpPr>
+          <p:cNvPr id="7" name="Rectangle 6">
+            <a:extLst>
+              <a:ext uri="{FF2B5EF4-FFF2-40B4-BE49-F238E27FC236}">
+                <a16:creationId xmlns:a16="http://schemas.microsoft.com/office/drawing/2014/main" id="{CCB2303E-C712-4CC7-A07E-30C89AA6C536}"/>
+              </a:ext>
+            </a:extLst>
+          </p:cNvPr>
+          <p:cNvSpPr/>
+          <p:nvPr/>
+        </p:nvSpPr>
+        <p:spPr>
+          <a:xfrm>
+            <a:off x="1632725" y="5999355"/>
+            <a:ext cx="579864" cy="549697"/>
+          </a:xfrm>
+          <a:prstGeom prst="rect">
+            <a:avLst/>
+          </a:prstGeom>
+          <a:solidFill>
+            <a:srgbClr val="FBBB4D"/>
+          </a:solidFill>
+          <a:ln>
+            <a:noFill/>
+          </a:ln>
+        </p:spPr>
+        <p:style>
+          <a:lnRef idx="2">
+            <a:schemeClr val="accent1">
+              <a:shade val="50000"/>
+            </a:schemeClr>
+          </a:lnRef>
+          <a:fillRef idx="1">
+            <a:schemeClr val="accent1"/>
+          </a:fillRef>
+          <a:effectRef idx="0">
+            <a:schemeClr val="accent1"/>
+          </a:effectRef>
+          <a:fontRef idx="minor">
+            <a:schemeClr val="lt1"/>
+          </a:fontRef>
+        </p:style>
+        <p:txBody>
+          <a:bodyPr rtlCol="0" anchor="ctr"/>
+          <a:lstStyle/>
+          <a:p>
+            <a:pPr algn="ctr"/>
+            <a:endParaRPr lang="en-US"/>
+          </a:p>
+        </p:txBody>
+      </p:sp>
+      <p:sp>
+        <p:nvSpPr>
+          <p:cNvPr id="8" name="Rectangle 7">
+            <a:extLst>
+              <a:ext uri="{FF2B5EF4-FFF2-40B4-BE49-F238E27FC236}">
+                <a16:creationId xmlns:a16="http://schemas.microsoft.com/office/drawing/2014/main" id="{5D372310-AF1C-41DC-90C3-5A0D1E14266A}"/>
+              </a:ext>
+            </a:extLst>
+          </p:cNvPr>
+          <p:cNvSpPr/>
+          <p:nvPr/>
+        </p:nvSpPr>
+        <p:spPr>
+          <a:xfrm>
+            <a:off x="2663284" y="5999355"/>
+            <a:ext cx="579864" cy="549697"/>
+          </a:xfrm>
+          <a:prstGeom prst="rect">
+            <a:avLst/>
+          </a:prstGeom>
+          <a:solidFill>
+            <a:srgbClr val="3EC451"/>
+          </a:solidFill>
+          <a:ln>
+            <a:noFill/>
+          </a:ln>
+        </p:spPr>
+        <p:style>
+          <a:lnRef idx="2">
+            <a:schemeClr val="accent1">
+              <a:shade val="50000"/>
+            </a:schemeClr>
+          </a:lnRef>
+          <a:fillRef idx="1">
+            <a:schemeClr val="accent1"/>
+          </a:fillRef>
+          <a:effectRef idx="0">
+            <a:schemeClr val="accent1"/>
+          </a:effectRef>
+          <a:fontRef idx="minor">
+            <a:schemeClr val="lt1"/>
+          </a:fontRef>
+        </p:style>
+        <p:txBody>
+          <a:bodyPr rtlCol="0" anchor="ctr"/>
+          <a:lstStyle/>
+          <a:p>
+            <a:pPr algn="ctr"/>
+            <a:endParaRPr lang="en-US" dirty="0"/>
+          </a:p>
+        </p:txBody>
+      </p:sp>
+      <p:sp>
+        <p:nvSpPr>
+          <p:cNvPr id="9" name="Rectangle 8">
+            <a:extLst>
+              <a:ext uri="{FF2B5EF4-FFF2-40B4-BE49-F238E27FC236}">
+                <a16:creationId xmlns:a16="http://schemas.microsoft.com/office/drawing/2014/main" id="{C59D9ACE-0F71-4801-AEA0-AA357C2034E7}"/>
+              </a:ext>
+            </a:extLst>
+          </p:cNvPr>
+          <p:cNvSpPr/>
+          <p:nvPr/>
+        </p:nvSpPr>
+        <p:spPr>
+          <a:xfrm>
+            <a:off x="3693843" y="5999355"/>
+            <a:ext cx="579864" cy="549697"/>
+          </a:xfrm>
+          <a:prstGeom prst="rect">
+            <a:avLst/>
+          </a:prstGeom>
+          <a:solidFill>
+            <a:srgbClr val="4BB8F3"/>
+          </a:solidFill>
+          <a:ln>
+            <a:noFill/>
+          </a:ln>
+        </p:spPr>
+        <p:style>
+          <a:lnRef idx="2">
+            <a:schemeClr val="accent1">
+              <a:shade val="50000"/>
+            </a:schemeClr>
+          </a:lnRef>
+          <a:fillRef idx="1">
+            <a:schemeClr val="accent1"/>
+          </a:fillRef>
+          <a:effectRef idx="0">
+            <a:schemeClr val="accent1"/>
+          </a:effectRef>
+          <a:fontRef idx="minor">
+            <a:schemeClr val="lt1"/>
+          </a:fontRef>
+        </p:style>
+        <p:txBody>
+          <a:bodyPr rtlCol="0" anchor="ctr"/>
+          <a:lstStyle/>
+          <a:p>
+            <a:pPr algn="ctr"/>
+            <a:endParaRPr lang="en-US"/>
+          </a:p>
+        </p:txBody>
+      </p:sp>
+      <p:sp>
+        <p:nvSpPr>
+          <p:cNvPr id="13" name="Rectangle 12">
+            <a:extLst>
+              <a:ext uri="{FF2B5EF4-FFF2-40B4-BE49-F238E27FC236}">
+                <a16:creationId xmlns:a16="http://schemas.microsoft.com/office/drawing/2014/main" id="{A4AF4B1F-0B61-4962-B93C-3A917575583C}"/>
+              </a:ext>
+            </a:extLst>
+          </p:cNvPr>
+          <p:cNvSpPr/>
+          <p:nvPr/>
+        </p:nvSpPr>
+        <p:spPr>
+          <a:xfrm>
+            <a:off x="4724402" y="5999355"/>
+            <a:ext cx="579864" cy="549697"/>
+          </a:xfrm>
+          <a:prstGeom prst="rect">
+            <a:avLst/>
+          </a:prstGeom>
+          <a:solidFill>
+            <a:srgbClr val="353535"/>
+          </a:solidFill>
+          <a:ln>
+            <a:noFill/>
+          </a:ln>
+        </p:spPr>
+        <p:style>
+          <a:lnRef idx="2">
+            <a:schemeClr val="accent1">
+              <a:shade val="50000"/>
+            </a:schemeClr>
+          </a:lnRef>
+          <a:fillRef idx="1">
+            <a:schemeClr val="accent1"/>
+          </a:fillRef>
+          <a:effectRef idx="0">
+            <a:schemeClr val="accent1"/>
+          </a:effectRef>
+          <a:fontRef idx="minor">
+            <a:schemeClr val="lt1"/>
+          </a:fontRef>
+        </p:style>
+        <p:txBody>
+          <a:bodyPr rtlCol="0" anchor="ctr"/>
+          <a:lstStyle/>
+          <a:p>
+            <a:pPr algn="ctr"/>
+            <a:endParaRPr lang="en-US"/>
+          </a:p>
+        </p:txBody>
+      </p:sp>
+      <p:sp>
+        <p:nvSpPr>
+          <p:cNvPr id="21" name="Rectangle 20">
+            <a:extLst>
+              <a:ext uri="{FF2B5EF4-FFF2-40B4-BE49-F238E27FC236}">
+                <a16:creationId xmlns:a16="http://schemas.microsoft.com/office/drawing/2014/main" id="{C9527B53-C5C5-409E-9633-74903E8F3DAA}"/>
+              </a:ext>
+            </a:extLst>
+          </p:cNvPr>
+          <p:cNvSpPr/>
+          <p:nvPr/>
+        </p:nvSpPr>
+        <p:spPr>
+          <a:xfrm>
+            <a:off x="602166" y="5999356"/>
+            <a:ext cx="579864" cy="549697"/>
+          </a:xfrm>
+          <a:prstGeom prst="rect">
+            <a:avLst/>
+          </a:prstGeom>
+          <a:solidFill>
+            <a:srgbClr val="F96160"/>
+          </a:solidFill>
+          <a:ln>
+            <a:noFill/>
+          </a:ln>
+        </p:spPr>
+        <p:style>
+          <a:lnRef idx="2">
+            <a:schemeClr val="accent1">
+              <a:shade val="50000"/>
+            </a:schemeClr>
+          </a:lnRef>
+          <a:fillRef idx="1">
+            <a:schemeClr val="accent1"/>
+          </a:fillRef>
+          <a:effectRef idx="0">
+            <a:schemeClr val="accent1"/>
+          </a:effectRef>
+          <a:fontRef idx="minor">
+            <a:schemeClr val="lt1"/>
+          </a:fontRef>
+        </p:style>
+        <p:txBody>
+          <a:bodyPr rtlCol="0" anchor="ctr"/>
+          <a:lstStyle/>
+          <a:p>
+            <a:pPr algn="ctr"/>
+            <a:endParaRPr lang="en-US"/>
+          </a:p>
+        </p:txBody>
+      </p:sp>
+      <p:sp>
+        <p:nvSpPr>
+          <p:cNvPr id="22" name="Rectangle 21">
+            <a:extLst>
+              <a:ext uri="{FF2B5EF4-FFF2-40B4-BE49-F238E27FC236}">
+                <a16:creationId xmlns:a16="http://schemas.microsoft.com/office/drawing/2014/main" id="{79845A40-9D1A-4ACA-A962-10F5951E4C90}"/>
+              </a:ext>
+            </a:extLst>
+          </p:cNvPr>
+          <p:cNvSpPr/>
+          <p:nvPr/>
+        </p:nvSpPr>
+        <p:spPr>
+          <a:xfrm>
+            <a:off x="1632725" y="5999355"/>
+            <a:ext cx="579864" cy="549697"/>
+          </a:xfrm>
+          <a:prstGeom prst="rect">
+            <a:avLst/>
+          </a:prstGeom>
+          <a:solidFill>
+            <a:srgbClr val="FBBB4D"/>
+          </a:solidFill>
+          <a:ln>
+            <a:noFill/>
+          </a:ln>
+        </p:spPr>
+        <p:style>
+          <a:lnRef idx="2">
+            <a:schemeClr val="accent1">
+              <a:shade val="50000"/>
+            </a:schemeClr>
+          </a:lnRef>
+          <a:fillRef idx="1">
+            <a:schemeClr val="accent1"/>
+          </a:fillRef>
+          <a:effectRef idx="0">
+            <a:schemeClr val="accent1"/>
+          </a:effectRef>
+          <a:fontRef idx="minor">
+            <a:schemeClr val="lt1"/>
+          </a:fontRef>
+        </p:style>
+        <p:txBody>
+          <a:bodyPr rtlCol="0" anchor="ctr"/>
+          <a:lstStyle/>
+          <a:p>
+            <a:pPr algn="ctr"/>
+            <a:endParaRPr lang="en-US"/>
+          </a:p>
+        </p:txBody>
+      </p:sp>
+      <p:sp>
+        <p:nvSpPr>
+          <p:cNvPr id="23" name="Rectangle 22">
+            <a:extLst>
+              <a:ext uri="{FF2B5EF4-FFF2-40B4-BE49-F238E27FC236}">
+                <a16:creationId xmlns:a16="http://schemas.microsoft.com/office/drawing/2014/main" id="{AE59CE73-14E3-4608-A356-D2119519506E}"/>
+              </a:ext>
+            </a:extLst>
+          </p:cNvPr>
+          <p:cNvSpPr/>
+          <p:nvPr/>
+        </p:nvSpPr>
+        <p:spPr>
+          <a:xfrm>
+            <a:off x="2663284" y="5999355"/>
+            <a:ext cx="579864" cy="549697"/>
+          </a:xfrm>
+          <a:prstGeom prst="rect">
+            <a:avLst/>
+          </a:prstGeom>
+          <a:solidFill>
+            <a:srgbClr val="3EC451"/>
+          </a:solidFill>
+          <a:ln>
+            <a:noFill/>
+          </a:ln>
+        </p:spPr>
+        <p:style>
+          <a:lnRef idx="2">
+            <a:schemeClr val="accent1">
+              <a:shade val="50000"/>
+            </a:schemeClr>
+          </a:lnRef>
+          <a:fillRef idx="1">
+            <a:schemeClr val="accent1"/>
+          </a:fillRef>
+          <a:effectRef idx="0">
+            <a:schemeClr val="accent1"/>
+          </a:effectRef>
+          <a:fontRef idx="minor">
+            <a:schemeClr val="lt1"/>
+          </a:fontRef>
+        </p:style>
+        <p:txBody>
+          <a:bodyPr rtlCol="0" anchor="ctr"/>
+          <a:lstStyle/>
+          <a:p>
+            <a:pPr algn="ctr"/>
+            <a:endParaRPr lang="en-US" dirty="0"/>
+          </a:p>
+        </p:txBody>
+      </p:sp>
+      <p:sp>
+        <p:nvSpPr>
+          <p:cNvPr id="24" name="Rectangle 23">
+            <a:extLst>
+              <a:ext uri="{FF2B5EF4-FFF2-40B4-BE49-F238E27FC236}">
+                <a16:creationId xmlns:a16="http://schemas.microsoft.com/office/drawing/2014/main" id="{C079055C-121E-4026-A811-3915394804C6}"/>
+              </a:ext>
+            </a:extLst>
+          </p:cNvPr>
+          <p:cNvSpPr/>
+          <p:nvPr/>
+        </p:nvSpPr>
+        <p:spPr>
+          <a:xfrm>
+            <a:off x="3693843" y="5999355"/>
+            <a:ext cx="579864" cy="549697"/>
+          </a:xfrm>
+          <a:prstGeom prst="rect">
+            <a:avLst/>
+          </a:prstGeom>
+          <a:solidFill>
+            <a:srgbClr val="4BB8F3"/>
+          </a:solidFill>
+          <a:ln>
+            <a:noFill/>
+          </a:ln>
+        </p:spPr>
+        <p:style>
+          <a:lnRef idx="2">
+            <a:schemeClr val="accent1">
+              <a:shade val="50000"/>
+            </a:schemeClr>
+          </a:lnRef>
+          <a:fillRef idx="1">
+            <a:schemeClr val="accent1"/>
+          </a:fillRef>
+          <a:effectRef idx="0">
+            <a:schemeClr val="accent1"/>
+          </a:effectRef>
+          <a:fontRef idx="minor">
+            <a:schemeClr val="lt1"/>
+          </a:fontRef>
+        </p:style>
+        <p:txBody>
+          <a:bodyPr rtlCol="0" anchor="ctr"/>
+          <a:lstStyle/>
+          <a:p>
+            <a:pPr algn="ctr"/>
+            <a:endParaRPr lang="en-US"/>
+          </a:p>
+        </p:txBody>
+      </p:sp>
+      <p:sp>
+        <p:nvSpPr>
+          <p:cNvPr id="25" name="Rectangle 24">
+            <a:extLst>
+              <a:ext uri="{FF2B5EF4-FFF2-40B4-BE49-F238E27FC236}">
+                <a16:creationId xmlns:a16="http://schemas.microsoft.com/office/drawing/2014/main" id="{45614592-593B-4CFE-8347-B5BE830FF4F9}"/>
+              </a:ext>
+            </a:extLst>
+          </p:cNvPr>
+          <p:cNvSpPr/>
+          <p:nvPr/>
+        </p:nvSpPr>
+        <p:spPr>
+          <a:xfrm>
+            <a:off x="602166" y="5211290"/>
+            <a:ext cx="579864" cy="549697"/>
+          </a:xfrm>
+          <a:prstGeom prst="rect">
+            <a:avLst/>
+          </a:prstGeom>
+          <a:solidFill>
+            <a:srgbClr val="F96160"/>
+          </a:solidFill>
+          <a:ln>
+            <a:noFill/>
+          </a:ln>
+        </p:spPr>
+        <p:style>
+          <a:lnRef idx="2">
+            <a:schemeClr val="accent1">
+              <a:shade val="50000"/>
+            </a:schemeClr>
+          </a:lnRef>
+          <a:fillRef idx="1">
+            <a:schemeClr val="accent1"/>
+          </a:fillRef>
+          <a:effectRef idx="0">
+            <a:schemeClr val="accent1"/>
+          </a:effectRef>
+          <a:fontRef idx="minor">
+            <a:schemeClr val="lt1"/>
+          </a:fontRef>
+        </p:style>
+        <p:txBody>
+          <a:bodyPr rtlCol="0" anchor="ctr"/>
+          <a:lstStyle/>
+          <a:p>
+            <a:pPr algn="ctr"/>
+            <a:endParaRPr lang="en-US"/>
+          </a:p>
+        </p:txBody>
+      </p:sp>
+      <p:sp>
+        <p:nvSpPr>
+          <p:cNvPr id="26" name="Rectangle 25">
+            <a:extLst>
+              <a:ext uri="{FF2B5EF4-FFF2-40B4-BE49-F238E27FC236}">
+                <a16:creationId xmlns:a16="http://schemas.microsoft.com/office/drawing/2014/main" id="{0D8FEDAB-4912-4330-AE2E-DD704246BCFA}"/>
+              </a:ext>
+            </a:extLst>
+          </p:cNvPr>
+          <p:cNvSpPr/>
+          <p:nvPr/>
+        </p:nvSpPr>
+        <p:spPr>
+          <a:xfrm>
+            <a:off x="1632725" y="5211290"/>
+            <a:ext cx="579864" cy="549697"/>
+          </a:xfrm>
+          <a:prstGeom prst="rect">
+            <a:avLst/>
+          </a:prstGeom>
+          <a:solidFill>
+            <a:srgbClr val="E2A74E"/>
+          </a:solidFill>
+          <a:ln>
+            <a:noFill/>
+          </a:ln>
+        </p:spPr>
+        <p:style>
+          <a:lnRef idx="2">
+            <a:schemeClr val="accent1">
+              <a:shade val="50000"/>
+            </a:schemeClr>
+          </a:lnRef>
+          <a:fillRef idx="1">
+            <a:schemeClr val="accent1"/>
+          </a:fillRef>
+          <a:effectRef idx="0">
+            <a:schemeClr val="accent1"/>
+          </a:effectRef>
+          <a:fontRef idx="minor">
+            <a:schemeClr val="lt1"/>
+          </a:fontRef>
+        </p:style>
+        <p:txBody>
+          <a:bodyPr rtlCol="0" anchor="ctr"/>
+          <a:lstStyle/>
+          <a:p>
+            <a:pPr algn="ctr"/>
+            <a:endParaRPr lang="en-US"/>
+          </a:p>
+        </p:txBody>
+      </p:sp>
+      <p:sp>
+        <p:nvSpPr>
+          <p:cNvPr id="27" name="Rectangle 26">
+            <a:extLst>
+              <a:ext uri="{FF2B5EF4-FFF2-40B4-BE49-F238E27FC236}">
+                <a16:creationId xmlns:a16="http://schemas.microsoft.com/office/drawing/2014/main" id="{33C22092-C1D7-4058-AC84-7897F51E4B08}"/>
+              </a:ext>
+            </a:extLst>
+          </p:cNvPr>
+          <p:cNvSpPr/>
+          <p:nvPr/>
+        </p:nvSpPr>
+        <p:spPr>
+          <a:xfrm>
+            <a:off x="2663284" y="5211290"/>
+            <a:ext cx="579864" cy="549697"/>
+          </a:xfrm>
+          <a:prstGeom prst="rect">
+            <a:avLst/>
+          </a:prstGeom>
+          <a:solidFill>
+            <a:srgbClr val="33AB40"/>
+          </a:solidFill>
+          <a:ln>
+            <a:noFill/>
+          </a:ln>
+        </p:spPr>
+        <p:style>
+          <a:lnRef idx="2">
+            <a:schemeClr val="accent1">
+              <a:shade val="50000"/>
+            </a:schemeClr>
+          </a:lnRef>
+          <a:fillRef idx="1">
+            <a:schemeClr val="accent1"/>
+          </a:fillRef>
+          <a:effectRef idx="0">
+            <a:schemeClr val="accent1"/>
+          </a:effectRef>
+          <a:fontRef idx="minor">
+            <a:schemeClr val="lt1"/>
+          </a:fontRef>
+        </p:style>
+        <p:txBody>
+          <a:bodyPr rtlCol="0" anchor="ctr"/>
+          <a:lstStyle/>
+          <a:p>
+            <a:pPr algn="ctr"/>
+            <a:endParaRPr lang="en-US" dirty="0"/>
+          </a:p>
+        </p:txBody>
+      </p:sp>
+      <p:sp>
+        <p:nvSpPr>
+          <p:cNvPr id="28" name="Rectangle 27">
+            <a:extLst>
+              <a:ext uri="{FF2B5EF4-FFF2-40B4-BE49-F238E27FC236}">
+                <a16:creationId xmlns:a16="http://schemas.microsoft.com/office/drawing/2014/main" id="{87B84CB9-28BC-4B7A-B402-58B998C86C8D}"/>
+              </a:ext>
+            </a:extLst>
+          </p:cNvPr>
+          <p:cNvSpPr/>
+          <p:nvPr/>
+        </p:nvSpPr>
+        <p:spPr>
+          <a:xfrm>
+            <a:off x="3693843" y="5193050"/>
+            <a:ext cx="579864" cy="549697"/>
+          </a:xfrm>
+          <a:prstGeom prst="rect">
+            <a:avLst/>
+          </a:prstGeom>
+          <a:solidFill>
+            <a:srgbClr val="44A0D4"/>
+          </a:solidFill>
+          <a:ln>
+            <a:noFill/>
+          </a:ln>
+        </p:spPr>
+        <p:style>
+          <a:lnRef idx="2">
+            <a:schemeClr val="accent1">
+              <a:shade val="50000"/>
+            </a:schemeClr>
+          </a:lnRef>
+          <a:fillRef idx="1">
+            <a:schemeClr val="accent1"/>
+          </a:fillRef>
+          <a:effectRef idx="0">
+            <a:schemeClr val="accent1"/>
+          </a:effectRef>
+          <a:fontRef idx="minor">
+            <a:schemeClr val="lt1"/>
+          </a:fontRef>
+        </p:style>
+        <p:txBody>
+          <a:bodyPr rtlCol="0" anchor="ctr"/>
+          <a:lstStyle/>
+          <a:p>
+            <a:pPr algn="ctr"/>
+            <a:endParaRPr lang="en-US"/>
+          </a:p>
+        </p:txBody>
+      </p:sp>
+      <p:grpSp>
+        <p:nvGrpSpPr>
+          <p:cNvPr id="2" name="Group 1">
+            <a:extLst>
+              <a:ext uri="{FF2B5EF4-FFF2-40B4-BE49-F238E27FC236}">
+                <a16:creationId xmlns:a16="http://schemas.microsoft.com/office/drawing/2014/main" id="{049A0524-A259-CC88-C841-2B628F96E6B6}"/>
+              </a:ext>
+            </a:extLst>
+          </p:cNvPr>
+          <p:cNvGrpSpPr/>
+          <p:nvPr/>
+        </p:nvGrpSpPr>
+        <p:grpSpPr>
+          <a:xfrm>
+            <a:off x="4631721" y="1983988"/>
+            <a:ext cx="2928558" cy="2890024"/>
+            <a:chOff x="4631721" y="1983988"/>
+            <a:chExt cx="2928558" cy="2890024"/>
+          </a:xfrm>
+        </p:grpSpPr>
+        <p:sp>
+          <p:nvSpPr>
+            <p:cNvPr id="4" name="Oval 3">
+              <a:extLst>
+                <a:ext uri="{FF2B5EF4-FFF2-40B4-BE49-F238E27FC236}">
+                  <a16:creationId xmlns:a16="http://schemas.microsoft.com/office/drawing/2014/main" id="{BFA83157-7024-45C1-85FC-67F98FA6164D}"/>
+                </a:ext>
+              </a:extLst>
+            </p:cNvPr>
+            <p:cNvSpPr/>
+            <p:nvPr/>
+          </p:nvSpPr>
+          <p:spPr>
+            <a:xfrm rot="2691303">
+              <a:off x="4631721" y="1983988"/>
+              <a:ext cx="2928558" cy="2890024"/>
+            </a:xfrm>
+            <a:prstGeom prst="ellipse">
+              <a:avLst/>
+            </a:prstGeom>
+            <a:solidFill>
+              <a:srgbClr val="161A21"/>
+            </a:solidFill>
+            <a:ln w="57150">
+              <a:solidFill>
+                <a:srgbClr val="161A21"/>
+              </a:solidFill>
+            </a:ln>
+          </p:spPr>
+          <p:style>
+            <a:lnRef idx="2">
+              <a:schemeClr val="accent1">
+                <a:shade val="50000"/>
+              </a:schemeClr>
+            </a:lnRef>
+            <a:fillRef idx="1">
+              <a:schemeClr val="accent1"/>
+            </a:fillRef>
+            <a:effectRef idx="0">
+              <a:schemeClr val="accent1"/>
+            </a:effectRef>
+            <a:fontRef idx="minor">
+              <a:schemeClr val="lt1"/>
+            </a:fontRef>
+          </p:style>
+          <p:txBody>
+            <a:bodyPr rtlCol="0" anchor="ctr"/>
+            <a:lstStyle/>
+            <a:p>
+              <a:pPr algn="ctr"/>
+              <a:endParaRPr lang="en-US"/>
+            </a:p>
+          </p:txBody>
+        </p:sp>
+        <p:sp>
+          <p:nvSpPr>
+            <p:cNvPr id="29" name="Rectangle: Rounded Corners 28">
+              <a:extLst>
+                <a:ext uri="{FF2B5EF4-FFF2-40B4-BE49-F238E27FC236}">
+                  <a16:creationId xmlns:a16="http://schemas.microsoft.com/office/drawing/2014/main" id="{CF5670BB-CF33-EDAE-2F56-098DF1927E42}"/>
+                </a:ext>
+              </a:extLst>
+            </p:cNvPr>
+            <p:cNvSpPr/>
+            <p:nvPr/>
+          </p:nvSpPr>
+          <p:spPr>
+            <a:xfrm rot="2727814">
+              <a:off x="5896016" y="2637481"/>
+              <a:ext cx="365760" cy="1644542"/>
+            </a:xfrm>
+            <a:prstGeom prst="roundRect">
+              <a:avLst>
+                <a:gd name="adj" fmla="val 50000"/>
+              </a:avLst>
+            </a:prstGeom>
+            <a:solidFill>
+              <a:srgbClr val="FFFFFF"/>
+            </a:solidFill>
+            <a:ln>
+              <a:noFill/>
+            </a:ln>
+          </p:spPr>
+          <p:style>
+            <a:lnRef idx="2">
+              <a:schemeClr val="accent1">
+                <a:shade val="50000"/>
+              </a:schemeClr>
+            </a:lnRef>
+            <a:fillRef idx="1">
+              <a:schemeClr val="accent1"/>
+            </a:fillRef>
+            <a:effectRef idx="0">
+              <a:schemeClr val="accent1"/>
+            </a:effectRef>
+            <a:fontRef idx="minor">
+              <a:schemeClr val="lt1"/>
+            </a:fontRef>
+          </p:style>
+          <p:txBody>
+            <a:bodyPr rtlCol="0" anchor="ctr"/>
+            <a:lstStyle/>
+            <a:p>
+              <a:pPr algn="ctr"/>
+              <a:endParaRPr lang="en-US"/>
+            </a:p>
+          </p:txBody>
+        </p:sp>
+        <p:sp>
+          <p:nvSpPr>
+            <p:cNvPr id="30" name="Rectangle: Rounded Corners 29">
+              <a:extLst>
+                <a:ext uri="{FF2B5EF4-FFF2-40B4-BE49-F238E27FC236}">
+                  <a16:creationId xmlns:a16="http://schemas.microsoft.com/office/drawing/2014/main" id="{BE74946D-0DD1-BE7A-A965-6AA99A0701AD}"/>
+                </a:ext>
+              </a:extLst>
+            </p:cNvPr>
+            <p:cNvSpPr/>
+            <p:nvPr/>
+          </p:nvSpPr>
+          <p:spPr>
+            <a:xfrm rot="18868349">
+              <a:off x="5896016" y="2636968"/>
+              <a:ext cx="365760" cy="1644542"/>
+            </a:xfrm>
+            <a:prstGeom prst="roundRect">
+              <a:avLst>
+                <a:gd name="adj" fmla="val 50000"/>
+              </a:avLst>
+            </a:prstGeom>
+            <a:solidFill>
+              <a:srgbClr val="FFFFFF"/>
+            </a:solidFill>
+            <a:ln>
+              <a:noFill/>
+            </a:ln>
+          </p:spPr>
+          <p:style>
+            <a:lnRef idx="2">
+              <a:schemeClr val="accent1">
+                <a:shade val="50000"/>
+              </a:schemeClr>
+            </a:lnRef>
+            <a:fillRef idx="1">
+              <a:schemeClr val="accent1"/>
+            </a:fillRef>
+            <a:effectRef idx="0">
+              <a:schemeClr val="accent1"/>
+            </a:effectRef>
+            <a:fontRef idx="minor">
+              <a:schemeClr val="lt1"/>
+            </a:fontRef>
+          </p:style>
+          <p:txBody>
+            <a:bodyPr rtlCol="0" anchor="ctr"/>
+            <a:lstStyle/>
+            <a:p>
+              <a:pPr algn="ctr"/>
+              <a:endParaRPr lang="en-US"/>
+            </a:p>
+          </p:txBody>
+        </p:sp>
+      </p:grpSp>
+    </p:spTree>
+    <p:extLst>
+      <p:ext uri="{BB962C8B-B14F-4D97-AF65-F5344CB8AC3E}">
+        <p14:creationId xmlns:p14="http://schemas.microsoft.com/office/powerpoint/2010/main" val="2223559627"/>
       </p:ext>
     </p:extLst>
   </p:cSld>
@@ -14718,10 +18282,10 @@
   <a:themeElements>
     <a:clrScheme name="Office">
       <a:dk1>
-        <a:sysClr val="windowText" lastClr="000000"/>
+        <a:sysClr val="windowText" lastClr="CDD2DC"/>
       </a:dk1>
       <a:lt1>
-        <a:sysClr val="window" lastClr="FFFFFF"/>
+        <a:sysClr val="window" lastClr="161A21"/>
       </a:lt1>
       <a:dk2>
         <a:srgbClr val="44546A"/>

</xml_diff>